<commit_message>
updated for mobile deck
</commit_message>
<xml_diff>
--- a/mvc/slides/a3_Mobile.pptx
+++ b/mvc/slides/a3_Mobile.pptx
@@ -5,35 +5,38 @@
     <p:sldMasterId id="2147483772" r:id="rId1"/>
   </p:sldMasterIdLst>
   <p:notesMasterIdLst>
-    <p:notesMasterId r:id="rId25"/>
+    <p:notesMasterId r:id="rId28"/>
   </p:notesMasterIdLst>
   <p:handoutMasterIdLst>
-    <p:handoutMasterId r:id="rId26"/>
+    <p:handoutMasterId r:id="rId29"/>
   </p:handoutMasterIdLst>
   <p:sldIdLst>
     <p:sldId id="327" r:id="rId2"/>
     <p:sldId id="393" r:id="rId3"/>
-    <p:sldId id="396" r:id="rId4"/>
-    <p:sldId id="394" r:id="rId5"/>
-    <p:sldId id="395" r:id="rId6"/>
-    <p:sldId id="397" r:id="rId7"/>
-    <p:sldId id="398" r:id="rId8"/>
-    <p:sldId id="399" r:id="rId9"/>
-    <p:sldId id="400" r:id="rId10"/>
-    <p:sldId id="401" r:id="rId11"/>
-    <p:sldId id="402" r:id="rId12"/>
-    <p:sldId id="403" r:id="rId13"/>
-    <p:sldId id="404" r:id="rId14"/>
-    <p:sldId id="407" r:id="rId15"/>
-    <p:sldId id="405" r:id="rId16"/>
-    <p:sldId id="406" r:id="rId17"/>
-    <p:sldId id="408" r:id="rId18"/>
-    <p:sldId id="409" r:id="rId19"/>
-    <p:sldId id="410" r:id="rId20"/>
-    <p:sldId id="411" r:id="rId21"/>
-    <p:sldId id="412" r:id="rId22"/>
-    <p:sldId id="413" r:id="rId23"/>
-    <p:sldId id="365" r:id="rId24"/>
+    <p:sldId id="414" r:id="rId4"/>
+    <p:sldId id="415" r:id="rId5"/>
+    <p:sldId id="416" r:id="rId6"/>
+    <p:sldId id="417" r:id="rId7"/>
+    <p:sldId id="396" r:id="rId8"/>
+    <p:sldId id="395" r:id="rId9"/>
+    <p:sldId id="397" r:id="rId10"/>
+    <p:sldId id="398" r:id="rId11"/>
+    <p:sldId id="399" r:id="rId12"/>
+    <p:sldId id="400" r:id="rId13"/>
+    <p:sldId id="401" r:id="rId14"/>
+    <p:sldId id="402" r:id="rId15"/>
+    <p:sldId id="403" r:id="rId16"/>
+    <p:sldId id="404" r:id="rId17"/>
+    <p:sldId id="407" r:id="rId18"/>
+    <p:sldId id="405" r:id="rId19"/>
+    <p:sldId id="406" r:id="rId20"/>
+    <p:sldId id="408" r:id="rId21"/>
+    <p:sldId id="409" r:id="rId22"/>
+    <p:sldId id="410" r:id="rId23"/>
+    <p:sldId id="411" r:id="rId24"/>
+    <p:sldId id="412" r:id="rId25"/>
+    <p:sldId id="413" r:id="rId26"/>
+    <p:sldId id="365" r:id="rId27"/>
   </p:sldIdLst>
   <p:sldSz cx="9144000" cy="6858000" type="screen4x3"/>
   <p:notesSz cx="7302500" cy="9588500"/>
@@ -256,7 +259,7 @@
               <a:pPr>
                 <a:defRPr/>
               </a:pPr>
-              <a:t>6/7/2012</a:t>
+              <a:t>7/8/2012</a:t>
             </a:fld>
             <a:endParaRPr lang="en-US"/>
           </a:p>
@@ -933,7 +936,7 @@
             <a:fld id="{F5EFE72E-DBBB-404D-9A21-07EBEB37E85F}" type="slidenum">
               <a:rPr lang="en-US" smtClean="0"/>
               <a:pPr/>
-              <a:t>23</a:t>
+              <a:t>26</a:t>
             </a:fld>
             <a:endParaRPr lang="en-US" smtClean="0"/>
           </a:p>
@@ -2824,7 +2827,11 @@
             <a:pPr marL="0" indent="0" defTabSz="914400" eaLnBrk="1" hangingPunct="1"/>
             <a:r>
               <a:rPr lang="en-US" dirty="0" smtClean="0"/>
-              <a:t>ASP.NET MVC &amp; jQuery Mobile</a:t>
+              <a:t>ASP.NET MVC &amp; </a:t>
+            </a:r>
+            <a:r>
+              <a:rPr lang="en-US" dirty="0" smtClean="0"/>
+              <a:t>Mobile Devices</a:t>
             </a:r>
             <a:br>
               <a:rPr lang="en-US" dirty="0" smtClean="0"/>
@@ -2836,59 +2843,117 @@
             <a:br>
               <a:rPr lang="en-US" dirty="0" smtClean="0"/>
             </a:br>
-            <a:r>
-              <a:rPr lang="en-US" sz="2400" dirty="0" smtClean="0">
-                <a:latin typeface="Myriad Pro Light"/>
-              </a:rPr>
-              <a:t>Scott Allen</a:t>
-            </a:r>
-            <a:br>
-              <a:rPr lang="en-US" sz="2400" dirty="0" smtClean="0">
-                <a:latin typeface="Myriad Pro Light"/>
-              </a:rPr>
-            </a:br>
-            <a:r>
-              <a:rPr lang="en-US" sz="2400" dirty="0" smtClean="0">
-                <a:latin typeface="Myriad Pro Light"/>
-              </a:rPr>
-              <a:t>@</a:t>
-            </a:r>
-            <a:r>
-              <a:rPr lang="en-US" sz="2400" dirty="0" err="1" smtClean="0">
-                <a:latin typeface="Myriad Pro Light"/>
-              </a:rPr>
-              <a:t>OdeToCode</a:t>
-            </a:r>
-            <a:r>
-              <a:rPr lang="en-US" sz="2400" dirty="0" smtClean="0">
-                <a:latin typeface="Myriad Pro Light"/>
-              </a:rPr>
-              <a:t/>
-            </a:r>
-            <a:br>
-              <a:rPr lang="en-US" sz="2400" dirty="0" smtClean="0">
-                <a:latin typeface="Myriad Pro Light"/>
-              </a:rPr>
-            </a:br>
-            <a:r>
-              <a:rPr lang="en-US" sz="2400" dirty="0" smtClean="0">
-                <a:latin typeface="Myriad Pro Light"/>
-              </a:rPr>
-              <a:t>scott@OdeToCode.com</a:t>
-            </a:r>
+            <a:endParaRPr lang="en-US" sz="2400" dirty="0" smtClean="0">
+              <a:latin typeface="Myriad Pro Light"/>
+            </a:endParaRPr>
+          </a:p>
+        </p:txBody>
+      </p:sp>
+    </p:spTree>
+  </p:cSld>
+  <p:clrMapOvr>
+    <a:masterClrMapping/>
+  </p:clrMapOvr>
+  <p:transition>
+    <p:fade/>
+  </p:transition>
+  <p:timing>
+    <p:tnLst>
+      <p:par>
+        <p:cTn id="1" dur="indefinite" restart="never" nodeType="tmRoot"/>
+      </p:par>
+    </p:tnLst>
+  </p:timing>
+</p:sld>
+</file>
+
+<file path=ppt/slides/slide10.xml><?xml version="1.0" encoding="utf-8"?>
+<p:sld xmlns:a="http://schemas.openxmlformats.org/drawingml/2006/main" xmlns:r="http://schemas.openxmlformats.org/officeDocument/2006/relationships" xmlns:p="http://schemas.openxmlformats.org/presentationml/2006/main">
+  <p:cSld>
+    <p:spTree>
+      <p:nvGrpSpPr>
+        <p:cNvPr id="1" name=""/>
+        <p:cNvGrpSpPr/>
+        <p:nvPr/>
+      </p:nvGrpSpPr>
+      <p:grpSpPr>
+        <a:xfrm>
+          <a:off x="0" y="0"/>
+          <a:ext cx="0" cy="0"/>
+          <a:chOff x="0" y="0"/>
+          <a:chExt cx="0" cy="0"/>
+        </a:xfrm>
+      </p:grpSpPr>
+      <p:sp>
+        <p:nvSpPr>
+          <p:cNvPr id="2" name="Title 1"/>
+          <p:cNvSpPr>
+            <a:spLocks noGrp="1"/>
+          </p:cNvSpPr>
+          <p:nvPr>
+            <p:ph type="title"/>
+          </p:nvPr>
+        </p:nvSpPr>
+        <p:spPr/>
+        <p:txBody>
+          <a:bodyPr/>
+          <a:lstStyle/>
+          <a:p>
+            <a:r>
+              <a:rPr lang="en-US" dirty="0" smtClean="0"/>
+              <a:t>Navigation</a:t>
+            </a:r>
+            <a:endParaRPr lang="en-US" dirty="0"/>
+          </a:p>
+        </p:txBody>
+      </p:sp>
+      <p:sp>
+        <p:nvSpPr>
+          <p:cNvPr id="3" name="Text Placeholder 2"/>
+          <p:cNvSpPr>
+            <a:spLocks noGrp="1"/>
+          </p:cNvSpPr>
+          <p:nvPr>
+            <p:ph type="body" idx="1"/>
+          </p:nvPr>
+        </p:nvSpPr>
+        <p:spPr/>
+        <p:txBody>
+          <a:bodyPr/>
+          <a:lstStyle/>
+          <a:p>
+            <a:r>
+              <a:rPr lang="en-US" dirty="0" smtClean="0"/>
+              <a:t>Default link and submit behavior is </a:t>
+            </a:r>
+            <a:r>
+              <a:rPr lang="en-US" dirty="0" err="1" smtClean="0"/>
+              <a:t>asynch</a:t>
+            </a:r>
+            <a:endParaRPr lang="en-US" dirty="0" smtClean="0"/>
+          </a:p>
+          <a:p>
+            <a:pPr lvl="1"/>
+            <a:r>
+              <a:rPr lang="en-US" dirty="0" smtClean="0"/>
+              <a:t>Impacts script and DOM structures</a:t>
+            </a:r>
+          </a:p>
+          <a:p>
+            <a:endParaRPr lang="en-US" dirty="0"/>
           </a:p>
         </p:txBody>
       </p:sp>
       <p:pic>
         <p:nvPicPr>
-          <p:cNvPr id="2050" name="Picture 2"/>
+          <p:cNvPr id="3074" name="Picture 2"/>
           <p:cNvPicPr>
             <a:picLocks noChangeAspect="1" noChangeArrowheads="1"/>
           </p:cNvPicPr>
           <p:nvPr/>
         </p:nvPicPr>
         <p:blipFill>
-          <a:blip r:embed="rId3">
+          <a:blip r:embed="rId2">
             <a:extLst>
               <a:ext uri="{28A0092B-C50C-407E-A947-70E740481C1C}">
                 <a14:useLocalDpi xmlns:a14="http://schemas.microsoft.com/office/drawing/2010/main" val="0"/>
@@ -2902,8 +2967,254 @@
         </p:blipFill>
         <p:spPr bwMode="auto">
           <a:xfrm>
-            <a:off x="4599214" y="3581400"/>
-            <a:ext cx="3955767" cy="1881187"/>
+            <a:off x="457200" y="3657600"/>
+            <a:ext cx="8369559" cy="1452829"/>
+          </a:xfrm>
+          <a:prstGeom prst="rect">
+            <a:avLst/>
+          </a:prstGeom>
+          <a:noFill/>
+          <a:ln>
+            <a:noFill/>
+          </a:ln>
+          <a:effectLst/>
+          <a:extLst>
+            <a:ext uri="{909E8E84-426E-40DD-AFC4-6F175D3DCCD1}">
+              <a14:hiddenFill xmlns:a14="http://schemas.microsoft.com/office/drawing/2010/main">
+                <a:solidFill>
+                  <a:schemeClr val="accent1"/>
+                </a:solidFill>
+              </a14:hiddenFill>
+            </a:ext>
+            <a:ext uri="{91240B29-F687-4F45-9708-019B960494DF}">
+              <a14:hiddenLine xmlns:a14="http://schemas.microsoft.com/office/drawing/2010/main" w="9525">
+                <a:solidFill>
+                  <a:schemeClr val="tx1"/>
+                </a:solidFill>
+                <a:miter lim="800000"/>
+                <a:headEnd/>
+                <a:tailEnd/>
+              </a14:hiddenLine>
+            </a:ext>
+            <a:ext uri="{AF507438-7753-43E0-B8FC-AC1667EBCBE1}">
+              <a14:hiddenEffects xmlns:a14="http://schemas.microsoft.com/office/drawing/2010/main">
+                <a:effectLst>
+                  <a:outerShdw dist="35921" dir="2700000" algn="ctr" rotWithShape="0">
+                    <a:schemeClr val="bg2"/>
+                  </a:outerShdw>
+                </a:effectLst>
+              </a14:hiddenEffects>
+            </a:ext>
+          </a:extLst>
+        </p:spPr>
+      </p:pic>
+      <p:cxnSp>
+        <p:nvCxnSpPr>
+          <p:cNvPr id="5" name="Straight Arrow Connector 4"/>
+          <p:cNvCxnSpPr/>
+          <p:nvPr/>
+        </p:nvCxnSpPr>
+        <p:spPr bwMode="auto">
+          <a:xfrm>
+            <a:off x="1524000" y="3048000"/>
+            <a:ext cx="685800" cy="609600"/>
+          </a:xfrm>
+          <a:prstGeom prst="straightConnector1">
+            <a:avLst/>
+          </a:prstGeom>
+          <a:gradFill rotWithShape="1">
+            <a:gsLst>
+              <a:gs pos="0">
+                <a:srgbClr val="A4D289"/>
+              </a:gs>
+              <a:gs pos="100000">
+                <a:schemeClr val="bg1"/>
+              </a:gs>
+            </a:gsLst>
+            <a:lin ang="5400000" scaled="1"/>
+          </a:gradFill>
+          <a:ln w="63500" cap="flat" cmpd="sng" algn="ctr">
+            <a:solidFill>
+              <a:srgbClr val="C00000"/>
+            </a:solidFill>
+            <a:prstDash val="solid"/>
+            <a:round/>
+            <a:headEnd type="none" w="med" len="med"/>
+            <a:tailEnd type="arrow"/>
+          </a:ln>
+          <a:effectLst/>
+        </p:spPr>
+      </p:cxnSp>
+      <p:cxnSp>
+        <p:nvCxnSpPr>
+          <p:cNvPr id="7" name="Straight Arrow Connector 6"/>
+          <p:cNvCxnSpPr/>
+          <p:nvPr/>
+        </p:nvCxnSpPr>
+        <p:spPr bwMode="auto">
+          <a:xfrm flipV="1">
+            <a:off x="990600" y="4724400"/>
+            <a:ext cx="1219200" cy="1447800"/>
+          </a:xfrm>
+          <a:prstGeom prst="straightConnector1">
+            <a:avLst/>
+          </a:prstGeom>
+          <a:gradFill rotWithShape="1">
+            <a:gsLst>
+              <a:gs pos="0">
+                <a:srgbClr val="A4D289"/>
+              </a:gs>
+              <a:gs pos="100000">
+                <a:schemeClr val="bg1"/>
+              </a:gs>
+            </a:gsLst>
+            <a:lin ang="5400000" scaled="1"/>
+          </a:gradFill>
+          <a:ln w="63500" cap="flat" cmpd="sng" algn="ctr">
+            <a:solidFill>
+              <a:srgbClr val="C00000"/>
+            </a:solidFill>
+            <a:prstDash val="solid"/>
+            <a:round/>
+            <a:headEnd type="none" w="med" len="med"/>
+            <a:tailEnd type="arrow"/>
+          </a:ln>
+          <a:effectLst/>
+        </p:spPr>
+      </p:cxnSp>
+    </p:spTree>
+    <p:extLst>
+      <p:ext uri="{BB962C8B-B14F-4D97-AF65-F5344CB8AC3E}">
+        <p14:creationId xmlns:p14="http://schemas.microsoft.com/office/powerpoint/2010/main" val="2669991755"/>
+      </p:ext>
+    </p:extLst>
+  </p:cSld>
+  <p:clrMapOvr>
+    <a:masterClrMapping/>
+  </p:clrMapOvr>
+  <p:transition>
+    <p:fade/>
+  </p:transition>
+  <p:timing>
+    <p:tnLst>
+      <p:par>
+        <p:cTn id="1" dur="indefinite" restart="never" nodeType="tmRoot"/>
+      </p:par>
+    </p:tnLst>
+  </p:timing>
+</p:sld>
+</file>
+
+<file path=ppt/slides/slide11.xml><?xml version="1.0" encoding="utf-8"?>
+<p:sld xmlns:a="http://schemas.openxmlformats.org/drawingml/2006/main" xmlns:r="http://schemas.openxmlformats.org/officeDocument/2006/relationships" xmlns:p="http://schemas.openxmlformats.org/presentationml/2006/main">
+  <p:cSld>
+    <p:spTree>
+      <p:nvGrpSpPr>
+        <p:cNvPr id="1" name=""/>
+        <p:cNvGrpSpPr/>
+        <p:nvPr/>
+      </p:nvGrpSpPr>
+      <p:grpSpPr>
+        <a:xfrm>
+          <a:off x="0" y="0"/>
+          <a:ext cx="0" cy="0"/>
+          <a:chOff x="0" y="0"/>
+          <a:chExt cx="0" cy="0"/>
+        </a:xfrm>
+      </p:grpSpPr>
+      <p:sp>
+        <p:nvSpPr>
+          <p:cNvPr id="2" name="Title 1"/>
+          <p:cNvSpPr>
+            <a:spLocks noGrp="1"/>
+          </p:cNvSpPr>
+          <p:nvPr>
+            <p:ph type="title"/>
+          </p:nvPr>
+        </p:nvSpPr>
+        <p:spPr/>
+        <p:txBody>
+          <a:bodyPr/>
+          <a:lstStyle/>
+          <a:p>
+            <a:r>
+              <a:rPr lang="en-US" dirty="0" smtClean="0"/>
+              <a:t>Stopping </a:t>
+            </a:r>
+            <a:r>
+              <a:rPr lang="en-US" dirty="0" err="1" smtClean="0"/>
+              <a:t>asynch</a:t>
+            </a:r>
+            <a:r>
+              <a:rPr lang="en-US" dirty="0" smtClean="0"/>
+              <a:t> links</a:t>
+            </a:r>
+            <a:endParaRPr lang="en-US" dirty="0"/>
+          </a:p>
+        </p:txBody>
+      </p:sp>
+      <p:sp>
+        <p:nvSpPr>
+          <p:cNvPr id="3" name="Text Placeholder 2"/>
+          <p:cNvSpPr>
+            <a:spLocks noGrp="1"/>
+          </p:cNvSpPr>
+          <p:nvPr>
+            <p:ph type="body" idx="1"/>
+          </p:nvPr>
+        </p:nvSpPr>
+        <p:spPr/>
+        <p:txBody>
+          <a:bodyPr/>
+          <a:lstStyle/>
+          <a:p>
+            <a:r>
+              <a:rPr lang="en-US" dirty="0" smtClean="0"/>
+              <a:t>Uses data-</a:t>
+            </a:r>
+            <a:r>
+              <a:rPr lang="en-US" dirty="0" err="1" smtClean="0"/>
+              <a:t>ajax</a:t>
+            </a:r>
+            <a:r>
+              <a:rPr lang="en-US" dirty="0" smtClean="0"/>
+              <a:t>=false</a:t>
+            </a:r>
+          </a:p>
+          <a:p>
+            <a:r>
+              <a:rPr lang="en-US" dirty="0" smtClean="0"/>
+              <a:t>Or turn off globally</a:t>
+            </a:r>
+            <a:endParaRPr lang="en-US" dirty="0"/>
+          </a:p>
+        </p:txBody>
+      </p:sp>
+      <p:pic>
+        <p:nvPicPr>
+          <p:cNvPr id="4098" name="Picture 2"/>
+          <p:cNvPicPr>
+            <a:picLocks noChangeAspect="1" noChangeArrowheads="1"/>
+          </p:cNvPicPr>
+          <p:nvPr/>
+        </p:nvPicPr>
+        <p:blipFill>
+          <a:blip r:embed="rId2">
+            <a:extLst>
+              <a:ext uri="{28A0092B-C50C-407E-A947-70E740481C1C}">
+                <a14:useLocalDpi xmlns:a14="http://schemas.microsoft.com/office/drawing/2010/main" val="0"/>
+              </a:ext>
+            </a:extLst>
+          </a:blip>
+          <a:srcRect/>
+          <a:stretch>
+            <a:fillRect/>
+          </a:stretch>
+        </p:blipFill>
+        <p:spPr bwMode="auto">
+          <a:xfrm>
+            <a:off x="485637" y="2642994"/>
+            <a:ext cx="8201163" cy="1929006"/>
           </a:xfrm>
           <a:prstGeom prst="rect">
             <a:avLst/>
@@ -2944,6 +3255,168 @@
         </p:spPr>
       </p:pic>
     </p:spTree>
+    <p:extLst>
+      <p:ext uri="{BB962C8B-B14F-4D97-AF65-F5344CB8AC3E}">
+        <p14:creationId xmlns:p14="http://schemas.microsoft.com/office/powerpoint/2010/main" val="3230423066"/>
+      </p:ext>
+    </p:extLst>
+  </p:cSld>
+  <p:clrMapOvr>
+    <a:masterClrMapping/>
+  </p:clrMapOvr>
+  <p:transition>
+    <p:fade/>
+  </p:transition>
+</p:sld>
+</file>
+
+<file path=ppt/slides/slide12.xml><?xml version="1.0" encoding="utf-8"?>
+<p:sld xmlns:a="http://schemas.openxmlformats.org/drawingml/2006/main" xmlns:r="http://schemas.openxmlformats.org/officeDocument/2006/relationships" xmlns:p="http://schemas.openxmlformats.org/presentationml/2006/main">
+  <p:cSld>
+    <p:spTree>
+      <p:nvGrpSpPr>
+        <p:cNvPr id="1" name=""/>
+        <p:cNvGrpSpPr/>
+        <p:nvPr/>
+      </p:nvGrpSpPr>
+      <p:grpSpPr>
+        <a:xfrm>
+          <a:off x="0" y="0"/>
+          <a:ext cx="0" cy="0"/>
+          <a:chOff x="0" y="0"/>
+          <a:chExt cx="0" cy="0"/>
+        </a:xfrm>
+      </p:grpSpPr>
+      <p:sp>
+        <p:nvSpPr>
+          <p:cNvPr id="2" name="Title 1"/>
+          <p:cNvSpPr>
+            <a:spLocks noGrp="1"/>
+          </p:cNvSpPr>
+          <p:nvPr>
+            <p:ph type="title"/>
+          </p:nvPr>
+        </p:nvSpPr>
+        <p:spPr/>
+        <p:txBody>
+          <a:bodyPr/>
+          <a:lstStyle/>
+          <a:p>
+            <a:r>
+              <a:rPr lang="en-US" dirty="0" smtClean="0"/>
+              <a:t>Toolbars</a:t>
+            </a:r>
+            <a:endParaRPr lang="en-US" dirty="0"/>
+          </a:p>
+        </p:txBody>
+      </p:sp>
+      <p:sp>
+        <p:nvSpPr>
+          <p:cNvPr id="3" name="Text Placeholder 2"/>
+          <p:cNvSpPr>
+            <a:spLocks noGrp="1"/>
+          </p:cNvSpPr>
+          <p:nvPr>
+            <p:ph type="body" idx="1"/>
+          </p:nvPr>
+        </p:nvSpPr>
+        <p:spPr/>
+        <p:txBody>
+          <a:bodyPr/>
+          <a:lstStyle/>
+          <a:p>
+            <a:r>
+              <a:rPr lang="en-US" dirty="0" smtClean="0"/>
+              <a:t>Headers and footers</a:t>
+            </a:r>
+          </a:p>
+          <a:p>
+            <a:pPr lvl="1"/>
+            <a:r>
+              <a:rPr lang="en-US" dirty="0" smtClean="0"/>
+              <a:t>Will turn links into buttons</a:t>
+            </a:r>
+          </a:p>
+          <a:p>
+            <a:pPr lvl="1"/>
+            <a:r>
+              <a:rPr lang="en-US" dirty="0" smtClean="0"/>
+              <a:t>Can position as fixed or inline</a:t>
+            </a:r>
+            <a:endParaRPr lang="en-US" dirty="0"/>
+          </a:p>
+        </p:txBody>
+      </p:sp>
+      <p:pic>
+        <p:nvPicPr>
+          <p:cNvPr id="5122" name="Picture 2"/>
+          <p:cNvPicPr>
+            <a:picLocks noChangeAspect="1" noChangeArrowheads="1"/>
+          </p:cNvPicPr>
+          <p:nvPr/>
+        </p:nvPicPr>
+        <p:blipFill>
+          <a:blip r:embed="rId2">
+            <a:extLst>
+              <a:ext uri="{28A0092B-C50C-407E-A947-70E740481C1C}">
+                <a14:useLocalDpi xmlns:a14="http://schemas.microsoft.com/office/drawing/2010/main" val="0"/>
+              </a:ext>
+            </a:extLst>
+          </a:blip>
+          <a:srcRect/>
+          <a:stretch>
+            <a:fillRect/>
+          </a:stretch>
+        </p:blipFill>
+        <p:spPr bwMode="auto">
+          <a:xfrm>
+            <a:off x="23813" y="3381375"/>
+            <a:ext cx="9096375" cy="1647825"/>
+          </a:xfrm>
+          <a:prstGeom prst="rect">
+            <a:avLst/>
+          </a:prstGeom>
+          <a:noFill/>
+          <a:ln>
+            <a:noFill/>
+          </a:ln>
+          <a:effectLst/>
+          <a:extLst>
+            <a:ext uri="{909E8E84-426E-40DD-AFC4-6F175D3DCCD1}">
+              <a14:hiddenFill xmlns:a14="http://schemas.microsoft.com/office/drawing/2010/main">
+                <a:solidFill>
+                  <a:schemeClr val="accent1"/>
+                </a:solidFill>
+              </a14:hiddenFill>
+            </a:ext>
+            <a:ext uri="{91240B29-F687-4F45-9708-019B960494DF}">
+              <a14:hiddenLine xmlns:a14="http://schemas.microsoft.com/office/drawing/2010/main" w="9525">
+                <a:solidFill>
+                  <a:schemeClr val="tx1"/>
+                </a:solidFill>
+                <a:miter lim="800000"/>
+                <a:headEnd/>
+                <a:tailEnd/>
+              </a14:hiddenLine>
+            </a:ext>
+            <a:ext uri="{AF507438-7753-43E0-B8FC-AC1667EBCBE1}">
+              <a14:hiddenEffects xmlns:a14="http://schemas.microsoft.com/office/drawing/2010/main">
+                <a:effectLst>
+                  <a:outerShdw dist="35921" dir="2700000" algn="ctr" rotWithShape="0">
+                    <a:schemeClr val="bg2"/>
+                  </a:outerShdw>
+                </a:effectLst>
+              </a14:hiddenEffects>
+            </a:ext>
+          </a:extLst>
+        </p:spPr>
+      </p:pic>
+    </p:spTree>
+    <p:extLst>
+      <p:ext uri="{BB962C8B-B14F-4D97-AF65-F5344CB8AC3E}">
+        <p14:creationId xmlns:p14="http://schemas.microsoft.com/office/powerpoint/2010/main" val="2018169388"/>
+      </p:ext>
+    </p:extLst>
   </p:cSld>
   <p:clrMapOvr>
     <a:masterClrMapping/>
@@ -2961,7 +3434,7 @@
 </p:sld>
 </file>
 
-<file path=ppt/slides/slide10.xml><?xml version="1.0" encoding="utf-8"?>
+<file path=ppt/slides/slide13.xml><?xml version="1.0" encoding="utf-8"?>
 <p:sld xmlns:a="http://schemas.openxmlformats.org/drawingml/2006/main" xmlns:r="http://schemas.openxmlformats.org/officeDocument/2006/relationships" xmlns:p="http://schemas.openxmlformats.org/presentationml/2006/main">
   <p:cSld>
     <p:spTree>
@@ -3141,7 +3614,7 @@
 </p:sld>
 </file>
 
-<file path=ppt/slides/slide11.xml><?xml version="1.0" encoding="utf-8"?>
+<file path=ppt/slides/slide14.xml><?xml version="1.0" encoding="utf-8"?>
 <p:sld xmlns:a="http://schemas.openxmlformats.org/drawingml/2006/main" xmlns:r="http://schemas.openxmlformats.org/officeDocument/2006/relationships" xmlns:p="http://schemas.openxmlformats.org/presentationml/2006/main">
   <p:cSld>
     <p:spTree>
@@ -3291,7 +3764,7 @@
 </p:sld>
 </file>
 
-<file path=ppt/slides/slide12.xml><?xml version="1.0" encoding="utf-8"?>
+<file path=ppt/slides/slide15.xml><?xml version="1.0" encoding="utf-8"?>
 <p:sld xmlns:a="http://schemas.openxmlformats.org/drawingml/2006/main" xmlns:r="http://schemas.openxmlformats.org/officeDocument/2006/relationships" xmlns:p="http://schemas.openxmlformats.org/presentationml/2006/main">
   <p:cSld>
     <p:spTree>
@@ -3447,7 +3920,7 @@
 </p:sld>
 </file>
 
-<file path=ppt/slides/slide13.xml><?xml version="1.0" encoding="utf-8"?>
+<file path=ppt/slides/slide16.xml><?xml version="1.0" encoding="utf-8"?>
 <p:sld xmlns:a="http://schemas.openxmlformats.org/drawingml/2006/main" xmlns:r="http://schemas.openxmlformats.org/officeDocument/2006/relationships" xmlns:p="http://schemas.openxmlformats.org/presentationml/2006/main">
   <p:cSld>
     <p:spTree>
@@ -3590,7 +4063,7 @@
 </p:sld>
 </file>
 
-<file path=ppt/slides/slide14.xml><?xml version="1.0" encoding="utf-8"?>
+<file path=ppt/slides/slide17.xml><?xml version="1.0" encoding="utf-8"?>
 <p:sld xmlns:a="http://schemas.openxmlformats.org/drawingml/2006/main" xmlns:r="http://schemas.openxmlformats.org/officeDocument/2006/relationships" xmlns:p="http://schemas.openxmlformats.org/presentationml/2006/main">
   <p:cSld>
     <p:spTree>
@@ -3733,7 +4206,7 @@
 </p:sld>
 </file>
 
-<file path=ppt/slides/slide15.xml><?xml version="1.0" encoding="utf-8"?>
+<file path=ppt/slides/slide18.xml><?xml version="1.0" encoding="utf-8"?>
 <p:sld xmlns:a="http://schemas.openxmlformats.org/drawingml/2006/main" xmlns:r="http://schemas.openxmlformats.org/officeDocument/2006/relationships" xmlns:p="http://schemas.openxmlformats.org/presentationml/2006/main">
   <p:cSld>
     <p:spTree>
@@ -3883,7 +4356,7 @@
 </p:sld>
 </file>
 
-<file path=ppt/slides/slide16.xml><?xml version="1.0" encoding="utf-8"?>
+<file path=ppt/slides/slide19.xml><?xml version="1.0" encoding="utf-8"?>
 <p:sld xmlns:a="http://schemas.openxmlformats.org/drawingml/2006/main" xmlns:r="http://schemas.openxmlformats.org/officeDocument/2006/relationships" xmlns:p="http://schemas.openxmlformats.org/presentationml/2006/main">
   <p:cSld>
     <p:spTree>
@@ -4023,594 +4496,6 @@
   <p:transition>
     <p:fade/>
   </p:transition>
-</p:sld>
-</file>
-
-<file path=ppt/slides/slide17.xml><?xml version="1.0" encoding="utf-8"?>
-<p:sld xmlns:a="http://schemas.openxmlformats.org/drawingml/2006/main" xmlns:r="http://schemas.openxmlformats.org/officeDocument/2006/relationships" xmlns:p="http://schemas.openxmlformats.org/presentationml/2006/main">
-  <p:cSld>
-    <p:spTree>
-      <p:nvGrpSpPr>
-        <p:cNvPr id="1" name=""/>
-        <p:cNvGrpSpPr/>
-        <p:nvPr/>
-      </p:nvGrpSpPr>
-      <p:grpSpPr>
-        <a:xfrm>
-          <a:off x="0" y="0"/>
-          <a:ext cx="0" cy="0"/>
-          <a:chOff x="0" y="0"/>
-          <a:chExt cx="0" cy="0"/>
-        </a:xfrm>
-      </p:grpSpPr>
-      <p:sp>
-        <p:nvSpPr>
-          <p:cNvPr id="2" name="Title 1"/>
-          <p:cNvSpPr>
-            <a:spLocks noGrp="1"/>
-          </p:cNvSpPr>
-          <p:nvPr>
-            <p:ph type="title"/>
-          </p:nvPr>
-        </p:nvSpPr>
-        <p:spPr/>
-        <p:txBody>
-          <a:bodyPr/>
-          <a:lstStyle/>
-          <a:p>
-            <a:r>
-              <a:rPr lang="en-US" dirty="0" smtClean="0"/>
-              <a:t>Form Elements</a:t>
-            </a:r>
-            <a:endParaRPr lang="en-US" dirty="0"/>
-          </a:p>
-        </p:txBody>
-      </p:sp>
-      <p:sp>
-        <p:nvSpPr>
-          <p:cNvPr id="3" name="Text Placeholder 2"/>
-          <p:cNvSpPr>
-            <a:spLocks noGrp="1"/>
-          </p:cNvSpPr>
-          <p:nvPr>
-            <p:ph type="body" idx="1"/>
-          </p:nvPr>
-        </p:nvSpPr>
-        <p:spPr/>
-        <p:txBody>
-          <a:bodyPr/>
-          <a:lstStyle/>
-          <a:p>
-            <a:r>
-              <a:rPr lang="en-US" dirty="0" smtClean="0"/>
-              <a:t>Inputs, labels, buttons all enhanced</a:t>
-            </a:r>
-          </a:p>
-          <a:p>
-            <a:endParaRPr lang="en-US" dirty="0"/>
-          </a:p>
-        </p:txBody>
-      </p:sp>
-      <p:pic>
-        <p:nvPicPr>
-          <p:cNvPr id="13314" name="Picture 2"/>
-          <p:cNvPicPr>
-            <a:picLocks noChangeAspect="1" noChangeArrowheads="1"/>
-          </p:cNvPicPr>
-          <p:nvPr/>
-        </p:nvPicPr>
-        <p:blipFill>
-          <a:blip r:embed="rId2">
-            <a:extLst>
-              <a:ext uri="{28A0092B-C50C-407E-A947-70E740481C1C}">
-                <a14:useLocalDpi xmlns:a14="http://schemas.microsoft.com/office/drawing/2010/main" val="0"/>
-              </a:ext>
-            </a:extLst>
-          </a:blip>
-          <a:srcRect/>
-          <a:stretch>
-            <a:fillRect/>
-          </a:stretch>
-        </p:blipFill>
-        <p:spPr bwMode="auto">
-          <a:xfrm>
-            <a:off x="3657600" y="2057400"/>
-            <a:ext cx="4591050" cy="3990975"/>
-          </a:xfrm>
-          <a:prstGeom prst="rect">
-            <a:avLst/>
-          </a:prstGeom>
-          <a:noFill/>
-          <a:ln>
-            <a:noFill/>
-          </a:ln>
-          <a:effectLst/>
-          <a:extLst>
-            <a:ext uri="{909E8E84-426E-40DD-AFC4-6F175D3DCCD1}">
-              <a14:hiddenFill xmlns:a14="http://schemas.microsoft.com/office/drawing/2010/main">
-                <a:solidFill>
-                  <a:schemeClr val="accent1"/>
-                </a:solidFill>
-              </a14:hiddenFill>
-            </a:ext>
-            <a:ext uri="{91240B29-F687-4F45-9708-019B960494DF}">
-              <a14:hiddenLine xmlns:a14="http://schemas.microsoft.com/office/drawing/2010/main" w="9525">
-                <a:solidFill>
-                  <a:schemeClr val="tx1"/>
-                </a:solidFill>
-                <a:miter lim="800000"/>
-                <a:headEnd/>
-                <a:tailEnd/>
-              </a14:hiddenLine>
-            </a:ext>
-            <a:ext uri="{AF507438-7753-43E0-B8FC-AC1667EBCBE1}">
-              <a14:hiddenEffects xmlns:a14="http://schemas.microsoft.com/office/drawing/2010/main">
-                <a:effectLst>
-                  <a:outerShdw dist="35921" dir="2700000" algn="ctr" rotWithShape="0">
-                    <a:schemeClr val="bg2"/>
-                  </a:outerShdw>
-                </a:effectLst>
-              </a14:hiddenEffects>
-            </a:ext>
-          </a:extLst>
-        </p:spPr>
-      </p:pic>
-    </p:spTree>
-    <p:extLst>
-      <p:ext uri="{BB962C8B-B14F-4D97-AF65-F5344CB8AC3E}">
-        <p14:creationId xmlns:p14="http://schemas.microsoft.com/office/powerpoint/2010/main" val="2431483968"/>
-      </p:ext>
-    </p:extLst>
-  </p:cSld>
-  <p:clrMapOvr>
-    <a:masterClrMapping/>
-  </p:clrMapOvr>
-  <p:transition>
-    <p:fade/>
-  </p:transition>
-</p:sld>
-</file>
-
-<file path=ppt/slides/slide18.xml><?xml version="1.0" encoding="utf-8"?>
-<p:sld xmlns:a="http://schemas.openxmlformats.org/drawingml/2006/main" xmlns:r="http://schemas.openxmlformats.org/officeDocument/2006/relationships" xmlns:p="http://schemas.openxmlformats.org/presentationml/2006/main">
-  <p:cSld>
-    <p:spTree>
-      <p:nvGrpSpPr>
-        <p:cNvPr id="1" name=""/>
-        <p:cNvGrpSpPr/>
-        <p:nvPr/>
-      </p:nvGrpSpPr>
-      <p:grpSpPr>
-        <a:xfrm>
-          <a:off x="0" y="0"/>
-          <a:ext cx="0" cy="0"/>
-          <a:chOff x="0" y="0"/>
-          <a:chExt cx="0" cy="0"/>
-        </a:xfrm>
-      </p:grpSpPr>
-      <p:sp>
-        <p:nvSpPr>
-          <p:cNvPr id="2" name="Title 1"/>
-          <p:cNvSpPr>
-            <a:spLocks noGrp="1"/>
-          </p:cNvSpPr>
-          <p:nvPr>
-            <p:ph type="title"/>
-          </p:nvPr>
-        </p:nvSpPr>
-        <p:spPr/>
-        <p:txBody>
-          <a:bodyPr/>
-          <a:lstStyle/>
-          <a:p>
-            <a:r>
-              <a:rPr lang="en-US" dirty="0" smtClean="0"/>
-              <a:t>Scripting	</a:t>
-            </a:r>
-            <a:endParaRPr lang="en-US" dirty="0"/>
-          </a:p>
-        </p:txBody>
-      </p:sp>
-      <p:sp>
-        <p:nvSpPr>
-          <p:cNvPr id="3" name="Text Placeholder 2"/>
-          <p:cNvSpPr>
-            <a:spLocks noGrp="1"/>
-          </p:cNvSpPr>
-          <p:nvPr>
-            <p:ph type="body" idx="1"/>
-          </p:nvPr>
-        </p:nvSpPr>
-        <p:spPr/>
-        <p:txBody>
-          <a:bodyPr/>
-          <a:lstStyle/>
-          <a:p>
-            <a:r>
-              <a:rPr lang="en-US" dirty="0" smtClean="0"/>
-              <a:t>Scripts inside of head tag only loaded in first request</a:t>
-            </a:r>
-          </a:p>
-          <a:p>
-            <a:pPr lvl="1"/>
-            <a:r>
-              <a:rPr lang="en-US" dirty="0" smtClean="0"/>
-              <a:t>Remember </a:t>
-            </a:r>
-            <a:r>
-              <a:rPr lang="en-US" dirty="0" err="1" smtClean="0"/>
-              <a:t>asynch</a:t>
-            </a:r>
-            <a:r>
-              <a:rPr lang="en-US" dirty="0" smtClean="0"/>
-              <a:t> navigation?</a:t>
-            </a:r>
-          </a:p>
-          <a:p>
-            <a:r>
-              <a:rPr lang="en-US" dirty="0" smtClean="0"/>
-              <a:t>$(document).ready is useless</a:t>
-            </a:r>
-          </a:p>
-          <a:p>
-            <a:r>
-              <a:rPr lang="en-US" dirty="0" smtClean="0"/>
-              <a:t>Use </a:t>
-            </a:r>
-            <a:r>
-              <a:rPr lang="en-US" dirty="0" err="1" smtClean="0"/>
-              <a:t>mobileinit</a:t>
-            </a:r>
-            <a:r>
-              <a:rPr lang="en-US" dirty="0" smtClean="0"/>
-              <a:t> event to configure </a:t>
-            </a:r>
-            <a:r>
-              <a:rPr lang="en-US" dirty="0" smtClean="0">
-                <a:hlinkClick r:id="rId2"/>
-              </a:rPr>
-              <a:t>defaults</a:t>
-            </a:r>
-            <a:endParaRPr lang="en-US" dirty="0"/>
-          </a:p>
-        </p:txBody>
-      </p:sp>
-      <p:pic>
-        <p:nvPicPr>
-          <p:cNvPr id="14338" name="Picture 2"/>
-          <p:cNvPicPr>
-            <a:picLocks noChangeAspect="1" noChangeArrowheads="1"/>
-          </p:cNvPicPr>
-          <p:nvPr/>
-        </p:nvPicPr>
-        <p:blipFill>
-          <a:blip r:embed="rId3">
-            <a:extLst>
-              <a:ext uri="{28A0092B-C50C-407E-A947-70E740481C1C}">
-                <a14:useLocalDpi xmlns:a14="http://schemas.microsoft.com/office/drawing/2010/main" val="0"/>
-              </a:ext>
-            </a:extLst>
-          </a:blip>
-          <a:srcRect/>
-          <a:stretch>
-            <a:fillRect/>
-          </a:stretch>
-        </p:blipFill>
-        <p:spPr bwMode="auto">
-          <a:xfrm>
-            <a:off x="304800" y="3276600"/>
-            <a:ext cx="8408020" cy="1981200"/>
-          </a:xfrm>
-          <a:prstGeom prst="rect">
-            <a:avLst/>
-          </a:prstGeom>
-          <a:noFill/>
-          <a:ln>
-            <a:noFill/>
-          </a:ln>
-          <a:effectLst/>
-          <a:extLst>
-            <a:ext uri="{909E8E84-426E-40DD-AFC4-6F175D3DCCD1}">
-              <a14:hiddenFill xmlns:a14="http://schemas.microsoft.com/office/drawing/2010/main">
-                <a:solidFill>
-                  <a:schemeClr val="accent1"/>
-                </a:solidFill>
-              </a14:hiddenFill>
-            </a:ext>
-            <a:ext uri="{91240B29-F687-4F45-9708-019B960494DF}">
-              <a14:hiddenLine xmlns:a14="http://schemas.microsoft.com/office/drawing/2010/main" w="9525">
-                <a:solidFill>
-                  <a:schemeClr val="tx1"/>
-                </a:solidFill>
-                <a:miter lim="800000"/>
-                <a:headEnd/>
-                <a:tailEnd/>
-              </a14:hiddenLine>
-            </a:ext>
-            <a:ext uri="{AF507438-7753-43E0-B8FC-AC1667EBCBE1}">
-              <a14:hiddenEffects xmlns:a14="http://schemas.microsoft.com/office/drawing/2010/main">
-                <a:effectLst>
-                  <a:outerShdw dist="35921" dir="2700000" algn="ctr" rotWithShape="0">
-                    <a:schemeClr val="bg2"/>
-                  </a:outerShdw>
-                </a:effectLst>
-              </a14:hiddenEffects>
-            </a:ext>
-          </a:extLst>
-        </p:spPr>
-      </p:pic>
-    </p:spTree>
-    <p:extLst>
-      <p:ext uri="{BB962C8B-B14F-4D97-AF65-F5344CB8AC3E}">
-        <p14:creationId xmlns:p14="http://schemas.microsoft.com/office/powerpoint/2010/main" val="1434277919"/>
-      </p:ext>
-    </p:extLst>
-  </p:cSld>
-  <p:clrMapOvr>
-    <a:masterClrMapping/>
-  </p:clrMapOvr>
-  <p:transition>
-    <p:fade/>
-  </p:transition>
-  <p:timing>
-    <p:tnLst>
-      <p:par>
-        <p:cTn id="1" dur="indefinite" restart="never" nodeType="tmRoot"/>
-      </p:par>
-    </p:tnLst>
-  </p:timing>
-</p:sld>
-</file>
-
-<file path=ppt/slides/slide19.xml><?xml version="1.0" encoding="utf-8"?>
-<p:sld xmlns:a="http://schemas.openxmlformats.org/drawingml/2006/main" xmlns:r="http://schemas.openxmlformats.org/officeDocument/2006/relationships" xmlns:p="http://schemas.openxmlformats.org/presentationml/2006/main">
-  <p:cSld>
-    <p:spTree>
-      <p:nvGrpSpPr>
-        <p:cNvPr id="1" name=""/>
-        <p:cNvGrpSpPr/>
-        <p:nvPr/>
-      </p:nvGrpSpPr>
-      <p:grpSpPr>
-        <a:xfrm>
-          <a:off x="0" y="0"/>
-          <a:ext cx="0" cy="0"/>
-          <a:chOff x="0" y="0"/>
-          <a:chExt cx="0" cy="0"/>
-        </a:xfrm>
-      </p:grpSpPr>
-      <p:sp>
-        <p:nvSpPr>
-          <p:cNvPr id="2" name="Title 1"/>
-          <p:cNvSpPr>
-            <a:spLocks noGrp="1"/>
-          </p:cNvSpPr>
-          <p:nvPr>
-            <p:ph type="title"/>
-          </p:nvPr>
-        </p:nvSpPr>
-        <p:spPr/>
-        <p:txBody>
-          <a:bodyPr/>
-          <a:lstStyle/>
-          <a:p>
-            <a:r>
-              <a:rPr lang="en-US" dirty="0" smtClean="0"/>
-              <a:t>Events</a:t>
-            </a:r>
-            <a:endParaRPr lang="en-US" dirty="0"/>
-          </a:p>
-        </p:txBody>
-      </p:sp>
-      <p:sp>
-        <p:nvSpPr>
-          <p:cNvPr id="3" name="Text Placeholder 2"/>
-          <p:cNvSpPr>
-            <a:spLocks noGrp="1"/>
-          </p:cNvSpPr>
-          <p:nvPr>
-            <p:ph type="body" idx="1"/>
-          </p:nvPr>
-        </p:nvSpPr>
-        <p:spPr/>
-        <p:txBody>
-          <a:bodyPr/>
-          <a:lstStyle/>
-          <a:p>
-            <a:r>
-              <a:rPr lang="en-US" dirty="0" err="1" smtClean="0"/>
-              <a:t>pageinit</a:t>
-            </a:r>
-            <a:endParaRPr lang="en-US" dirty="0" smtClean="0"/>
-          </a:p>
-          <a:p>
-            <a:r>
-              <a:rPr lang="en-US" dirty="0" err="1" smtClean="0"/>
-              <a:t>pagebeforeload</a:t>
-            </a:r>
-            <a:r>
-              <a:rPr lang="en-US" dirty="0" smtClean="0"/>
-              <a:t> / </a:t>
-            </a:r>
-            <a:r>
-              <a:rPr lang="en-US" dirty="0" err="1" smtClean="0"/>
-              <a:t>pageload</a:t>
-            </a:r>
-            <a:r>
-              <a:rPr lang="en-US" dirty="0" smtClean="0"/>
-              <a:t> / </a:t>
-            </a:r>
-            <a:r>
-              <a:rPr lang="en-US" dirty="0" err="1" smtClean="0"/>
-              <a:t>pageloadfailed</a:t>
-            </a:r>
-            <a:endParaRPr lang="en-US" dirty="0" smtClean="0"/>
-          </a:p>
-          <a:p>
-            <a:r>
-              <a:rPr lang="en-US" dirty="0" err="1" smtClean="0"/>
-              <a:t>pagebeforechange</a:t>
-            </a:r>
-            <a:r>
-              <a:rPr lang="en-US" dirty="0" smtClean="0"/>
-              <a:t> / </a:t>
-            </a:r>
-            <a:r>
-              <a:rPr lang="en-US" dirty="0" err="1" smtClean="0"/>
-              <a:t>pagechange</a:t>
-            </a:r>
-            <a:r>
-              <a:rPr lang="en-US" dirty="0" smtClean="0"/>
-              <a:t> / </a:t>
-            </a:r>
-            <a:r>
-              <a:rPr lang="en-US" dirty="0" err="1" smtClean="0"/>
-              <a:t>pagechangefailed</a:t>
-            </a:r>
-            <a:endParaRPr lang="en-US" dirty="0" smtClean="0"/>
-          </a:p>
-          <a:p>
-            <a:r>
-              <a:rPr lang="en-US" dirty="0" err="1" smtClean="0"/>
-              <a:t>pagebeforeshow</a:t>
-            </a:r>
-            <a:r>
-              <a:rPr lang="en-US" dirty="0" smtClean="0"/>
-              <a:t> / </a:t>
-            </a:r>
-            <a:r>
-              <a:rPr lang="en-US" dirty="0" err="1" smtClean="0"/>
-              <a:t>pagebeforehide</a:t>
-            </a:r>
-            <a:r>
-              <a:rPr lang="en-US" dirty="0" smtClean="0"/>
-              <a:t> / </a:t>
-            </a:r>
-            <a:r>
-              <a:rPr lang="en-US" dirty="0" err="1" smtClean="0"/>
-              <a:t>pageshow</a:t>
-            </a:r>
-            <a:endParaRPr lang="en-US" dirty="0" smtClean="0"/>
-          </a:p>
-          <a:p>
-            <a:r>
-              <a:rPr lang="en-US" dirty="0" err="1" smtClean="0"/>
-              <a:t>pagebeforecreate</a:t>
-            </a:r>
-            <a:r>
-              <a:rPr lang="en-US" dirty="0" smtClean="0"/>
-              <a:t> / </a:t>
-            </a:r>
-            <a:r>
-              <a:rPr lang="en-US" dirty="0" err="1" smtClean="0"/>
-              <a:t>pagecreate</a:t>
-            </a:r>
-            <a:r>
-              <a:rPr lang="en-US" dirty="0" smtClean="0"/>
-              <a:t> / </a:t>
-            </a:r>
-            <a:r>
-              <a:rPr lang="en-US" dirty="0" err="1" smtClean="0"/>
-              <a:t>pageinit</a:t>
-            </a:r>
-            <a:endParaRPr lang="en-US" dirty="0" smtClean="0"/>
-          </a:p>
-          <a:p>
-            <a:r>
-              <a:rPr lang="en-US" dirty="0" err="1" smtClean="0"/>
-              <a:t>pageremove</a:t>
-            </a:r>
-            <a:endParaRPr lang="en-US" dirty="0" smtClean="0"/>
-          </a:p>
-          <a:p>
-            <a:endParaRPr lang="en-US" dirty="0"/>
-          </a:p>
-        </p:txBody>
-      </p:sp>
-      <p:pic>
-        <p:nvPicPr>
-          <p:cNvPr id="15362" name="Picture 2"/>
-          <p:cNvPicPr>
-            <a:picLocks noChangeAspect="1" noChangeArrowheads="1"/>
-          </p:cNvPicPr>
-          <p:nvPr/>
-        </p:nvPicPr>
-        <p:blipFill>
-          <a:blip r:embed="rId2">
-            <a:extLst>
-              <a:ext uri="{28A0092B-C50C-407E-A947-70E740481C1C}">
-                <a14:useLocalDpi xmlns:a14="http://schemas.microsoft.com/office/drawing/2010/main" val="0"/>
-              </a:ext>
-            </a:extLst>
-          </a:blip>
-          <a:srcRect/>
-          <a:stretch>
-            <a:fillRect/>
-          </a:stretch>
-        </p:blipFill>
-        <p:spPr bwMode="auto">
-          <a:xfrm>
-            <a:off x="1278488" y="4495800"/>
-            <a:ext cx="6534150" cy="1200150"/>
-          </a:xfrm>
-          <a:prstGeom prst="rect">
-            <a:avLst/>
-          </a:prstGeom>
-          <a:noFill/>
-          <a:ln>
-            <a:noFill/>
-          </a:ln>
-          <a:effectLst/>
-          <a:extLst>
-            <a:ext uri="{909E8E84-426E-40DD-AFC4-6F175D3DCCD1}">
-              <a14:hiddenFill xmlns:a14="http://schemas.microsoft.com/office/drawing/2010/main">
-                <a:solidFill>
-                  <a:schemeClr val="accent1"/>
-                </a:solidFill>
-              </a14:hiddenFill>
-            </a:ext>
-            <a:ext uri="{91240B29-F687-4F45-9708-019B960494DF}">
-              <a14:hiddenLine xmlns:a14="http://schemas.microsoft.com/office/drawing/2010/main" w="9525">
-                <a:solidFill>
-                  <a:schemeClr val="tx1"/>
-                </a:solidFill>
-                <a:miter lim="800000"/>
-                <a:headEnd/>
-                <a:tailEnd/>
-              </a14:hiddenLine>
-            </a:ext>
-            <a:ext uri="{AF507438-7753-43E0-B8FC-AC1667EBCBE1}">
-              <a14:hiddenEffects xmlns:a14="http://schemas.microsoft.com/office/drawing/2010/main">
-                <a:effectLst>
-                  <a:outerShdw dist="35921" dir="2700000" algn="ctr" rotWithShape="0">
-                    <a:schemeClr val="bg2"/>
-                  </a:outerShdw>
-                </a:effectLst>
-              </a14:hiddenEffects>
-            </a:ext>
-          </a:extLst>
-        </p:spPr>
-      </p:pic>
-    </p:spTree>
-    <p:extLst>
-      <p:ext uri="{BB962C8B-B14F-4D97-AF65-F5344CB8AC3E}">
-        <p14:creationId xmlns:p14="http://schemas.microsoft.com/office/powerpoint/2010/main" val="3984987282"/>
-      </p:ext>
-    </p:extLst>
-  </p:cSld>
-  <p:clrMapOvr>
-    <a:masterClrMapping/>
-  </p:clrMapOvr>
-  <p:transition>
-    <p:fade/>
-  </p:transition>
-  <p:timing>
-    <p:tnLst>
-      <p:par>
-        <p:cTn id="1" dur="indefinite" restart="never" nodeType="tmRoot"/>
-      </p:par>
-    </p:tnLst>
-  </p:timing>
 </p:sld>
 </file>
 
@@ -5416,6 +5301,594 @@
           <a:p>
             <a:r>
               <a:rPr lang="en-US" dirty="0" smtClean="0"/>
+              <a:t>Form Elements</a:t>
+            </a:r>
+            <a:endParaRPr lang="en-US" dirty="0"/>
+          </a:p>
+        </p:txBody>
+      </p:sp>
+      <p:sp>
+        <p:nvSpPr>
+          <p:cNvPr id="3" name="Text Placeholder 2"/>
+          <p:cNvSpPr>
+            <a:spLocks noGrp="1"/>
+          </p:cNvSpPr>
+          <p:nvPr>
+            <p:ph type="body" idx="1"/>
+          </p:nvPr>
+        </p:nvSpPr>
+        <p:spPr/>
+        <p:txBody>
+          <a:bodyPr/>
+          <a:lstStyle/>
+          <a:p>
+            <a:r>
+              <a:rPr lang="en-US" dirty="0" smtClean="0"/>
+              <a:t>Inputs, labels, buttons all enhanced</a:t>
+            </a:r>
+          </a:p>
+          <a:p>
+            <a:endParaRPr lang="en-US" dirty="0"/>
+          </a:p>
+        </p:txBody>
+      </p:sp>
+      <p:pic>
+        <p:nvPicPr>
+          <p:cNvPr id="13314" name="Picture 2"/>
+          <p:cNvPicPr>
+            <a:picLocks noChangeAspect="1" noChangeArrowheads="1"/>
+          </p:cNvPicPr>
+          <p:nvPr/>
+        </p:nvPicPr>
+        <p:blipFill>
+          <a:blip r:embed="rId2">
+            <a:extLst>
+              <a:ext uri="{28A0092B-C50C-407E-A947-70E740481C1C}">
+                <a14:useLocalDpi xmlns:a14="http://schemas.microsoft.com/office/drawing/2010/main" val="0"/>
+              </a:ext>
+            </a:extLst>
+          </a:blip>
+          <a:srcRect/>
+          <a:stretch>
+            <a:fillRect/>
+          </a:stretch>
+        </p:blipFill>
+        <p:spPr bwMode="auto">
+          <a:xfrm>
+            <a:off x="3657600" y="2057400"/>
+            <a:ext cx="4591050" cy="3990975"/>
+          </a:xfrm>
+          <a:prstGeom prst="rect">
+            <a:avLst/>
+          </a:prstGeom>
+          <a:noFill/>
+          <a:ln>
+            <a:noFill/>
+          </a:ln>
+          <a:effectLst/>
+          <a:extLst>
+            <a:ext uri="{909E8E84-426E-40DD-AFC4-6F175D3DCCD1}">
+              <a14:hiddenFill xmlns:a14="http://schemas.microsoft.com/office/drawing/2010/main">
+                <a:solidFill>
+                  <a:schemeClr val="accent1"/>
+                </a:solidFill>
+              </a14:hiddenFill>
+            </a:ext>
+            <a:ext uri="{91240B29-F687-4F45-9708-019B960494DF}">
+              <a14:hiddenLine xmlns:a14="http://schemas.microsoft.com/office/drawing/2010/main" w="9525">
+                <a:solidFill>
+                  <a:schemeClr val="tx1"/>
+                </a:solidFill>
+                <a:miter lim="800000"/>
+                <a:headEnd/>
+                <a:tailEnd/>
+              </a14:hiddenLine>
+            </a:ext>
+            <a:ext uri="{AF507438-7753-43E0-B8FC-AC1667EBCBE1}">
+              <a14:hiddenEffects xmlns:a14="http://schemas.microsoft.com/office/drawing/2010/main">
+                <a:effectLst>
+                  <a:outerShdw dist="35921" dir="2700000" algn="ctr" rotWithShape="0">
+                    <a:schemeClr val="bg2"/>
+                  </a:outerShdw>
+                </a:effectLst>
+              </a14:hiddenEffects>
+            </a:ext>
+          </a:extLst>
+        </p:spPr>
+      </p:pic>
+    </p:spTree>
+    <p:extLst>
+      <p:ext uri="{BB962C8B-B14F-4D97-AF65-F5344CB8AC3E}">
+        <p14:creationId xmlns:p14="http://schemas.microsoft.com/office/powerpoint/2010/main" val="2431483968"/>
+      </p:ext>
+    </p:extLst>
+  </p:cSld>
+  <p:clrMapOvr>
+    <a:masterClrMapping/>
+  </p:clrMapOvr>
+  <p:transition>
+    <p:fade/>
+  </p:transition>
+</p:sld>
+</file>
+
+<file path=ppt/slides/slide21.xml><?xml version="1.0" encoding="utf-8"?>
+<p:sld xmlns:a="http://schemas.openxmlformats.org/drawingml/2006/main" xmlns:r="http://schemas.openxmlformats.org/officeDocument/2006/relationships" xmlns:p="http://schemas.openxmlformats.org/presentationml/2006/main">
+  <p:cSld>
+    <p:spTree>
+      <p:nvGrpSpPr>
+        <p:cNvPr id="1" name=""/>
+        <p:cNvGrpSpPr/>
+        <p:nvPr/>
+      </p:nvGrpSpPr>
+      <p:grpSpPr>
+        <a:xfrm>
+          <a:off x="0" y="0"/>
+          <a:ext cx="0" cy="0"/>
+          <a:chOff x="0" y="0"/>
+          <a:chExt cx="0" cy="0"/>
+        </a:xfrm>
+      </p:grpSpPr>
+      <p:sp>
+        <p:nvSpPr>
+          <p:cNvPr id="2" name="Title 1"/>
+          <p:cNvSpPr>
+            <a:spLocks noGrp="1"/>
+          </p:cNvSpPr>
+          <p:nvPr>
+            <p:ph type="title"/>
+          </p:nvPr>
+        </p:nvSpPr>
+        <p:spPr/>
+        <p:txBody>
+          <a:bodyPr/>
+          <a:lstStyle/>
+          <a:p>
+            <a:r>
+              <a:rPr lang="en-US" dirty="0" smtClean="0"/>
+              <a:t>Scripting	</a:t>
+            </a:r>
+            <a:endParaRPr lang="en-US" dirty="0"/>
+          </a:p>
+        </p:txBody>
+      </p:sp>
+      <p:sp>
+        <p:nvSpPr>
+          <p:cNvPr id="3" name="Text Placeholder 2"/>
+          <p:cNvSpPr>
+            <a:spLocks noGrp="1"/>
+          </p:cNvSpPr>
+          <p:nvPr>
+            <p:ph type="body" idx="1"/>
+          </p:nvPr>
+        </p:nvSpPr>
+        <p:spPr/>
+        <p:txBody>
+          <a:bodyPr/>
+          <a:lstStyle/>
+          <a:p>
+            <a:r>
+              <a:rPr lang="en-US" dirty="0" smtClean="0"/>
+              <a:t>Scripts inside of head tag only loaded in first request</a:t>
+            </a:r>
+          </a:p>
+          <a:p>
+            <a:pPr lvl="1"/>
+            <a:r>
+              <a:rPr lang="en-US" dirty="0" smtClean="0"/>
+              <a:t>Remember </a:t>
+            </a:r>
+            <a:r>
+              <a:rPr lang="en-US" dirty="0" err="1" smtClean="0"/>
+              <a:t>asynch</a:t>
+            </a:r>
+            <a:r>
+              <a:rPr lang="en-US" dirty="0" smtClean="0"/>
+              <a:t> navigation?</a:t>
+            </a:r>
+          </a:p>
+          <a:p>
+            <a:r>
+              <a:rPr lang="en-US" dirty="0" smtClean="0"/>
+              <a:t>$(document).ready is useless</a:t>
+            </a:r>
+          </a:p>
+          <a:p>
+            <a:r>
+              <a:rPr lang="en-US" dirty="0" smtClean="0"/>
+              <a:t>Use </a:t>
+            </a:r>
+            <a:r>
+              <a:rPr lang="en-US" dirty="0" err="1" smtClean="0"/>
+              <a:t>mobileinit</a:t>
+            </a:r>
+            <a:r>
+              <a:rPr lang="en-US" dirty="0" smtClean="0"/>
+              <a:t> event to configure </a:t>
+            </a:r>
+            <a:r>
+              <a:rPr lang="en-US" dirty="0" smtClean="0">
+                <a:hlinkClick r:id="rId2"/>
+              </a:rPr>
+              <a:t>defaults</a:t>
+            </a:r>
+            <a:endParaRPr lang="en-US" dirty="0"/>
+          </a:p>
+        </p:txBody>
+      </p:sp>
+      <p:pic>
+        <p:nvPicPr>
+          <p:cNvPr id="14338" name="Picture 2"/>
+          <p:cNvPicPr>
+            <a:picLocks noChangeAspect="1" noChangeArrowheads="1"/>
+          </p:cNvPicPr>
+          <p:nvPr/>
+        </p:nvPicPr>
+        <p:blipFill>
+          <a:blip r:embed="rId3">
+            <a:extLst>
+              <a:ext uri="{28A0092B-C50C-407E-A947-70E740481C1C}">
+                <a14:useLocalDpi xmlns:a14="http://schemas.microsoft.com/office/drawing/2010/main" val="0"/>
+              </a:ext>
+            </a:extLst>
+          </a:blip>
+          <a:srcRect/>
+          <a:stretch>
+            <a:fillRect/>
+          </a:stretch>
+        </p:blipFill>
+        <p:spPr bwMode="auto">
+          <a:xfrm>
+            <a:off x="304800" y="3276600"/>
+            <a:ext cx="8408020" cy="1981200"/>
+          </a:xfrm>
+          <a:prstGeom prst="rect">
+            <a:avLst/>
+          </a:prstGeom>
+          <a:noFill/>
+          <a:ln>
+            <a:noFill/>
+          </a:ln>
+          <a:effectLst/>
+          <a:extLst>
+            <a:ext uri="{909E8E84-426E-40DD-AFC4-6F175D3DCCD1}">
+              <a14:hiddenFill xmlns:a14="http://schemas.microsoft.com/office/drawing/2010/main">
+                <a:solidFill>
+                  <a:schemeClr val="accent1"/>
+                </a:solidFill>
+              </a14:hiddenFill>
+            </a:ext>
+            <a:ext uri="{91240B29-F687-4F45-9708-019B960494DF}">
+              <a14:hiddenLine xmlns:a14="http://schemas.microsoft.com/office/drawing/2010/main" w="9525">
+                <a:solidFill>
+                  <a:schemeClr val="tx1"/>
+                </a:solidFill>
+                <a:miter lim="800000"/>
+                <a:headEnd/>
+                <a:tailEnd/>
+              </a14:hiddenLine>
+            </a:ext>
+            <a:ext uri="{AF507438-7753-43E0-B8FC-AC1667EBCBE1}">
+              <a14:hiddenEffects xmlns:a14="http://schemas.microsoft.com/office/drawing/2010/main">
+                <a:effectLst>
+                  <a:outerShdw dist="35921" dir="2700000" algn="ctr" rotWithShape="0">
+                    <a:schemeClr val="bg2"/>
+                  </a:outerShdw>
+                </a:effectLst>
+              </a14:hiddenEffects>
+            </a:ext>
+          </a:extLst>
+        </p:spPr>
+      </p:pic>
+    </p:spTree>
+    <p:extLst>
+      <p:ext uri="{BB962C8B-B14F-4D97-AF65-F5344CB8AC3E}">
+        <p14:creationId xmlns:p14="http://schemas.microsoft.com/office/powerpoint/2010/main" val="1434277919"/>
+      </p:ext>
+    </p:extLst>
+  </p:cSld>
+  <p:clrMapOvr>
+    <a:masterClrMapping/>
+  </p:clrMapOvr>
+  <p:transition>
+    <p:fade/>
+  </p:transition>
+  <p:timing>
+    <p:tnLst>
+      <p:par>
+        <p:cTn id="1" dur="indefinite" restart="never" nodeType="tmRoot"/>
+      </p:par>
+    </p:tnLst>
+  </p:timing>
+</p:sld>
+</file>
+
+<file path=ppt/slides/slide22.xml><?xml version="1.0" encoding="utf-8"?>
+<p:sld xmlns:a="http://schemas.openxmlformats.org/drawingml/2006/main" xmlns:r="http://schemas.openxmlformats.org/officeDocument/2006/relationships" xmlns:p="http://schemas.openxmlformats.org/presentationml/2006/main">
+  <p:cSld>
+    <p:spTree>
+      <p:nvGrpSpPr>
+        <p:cNvPr id="1" name=""/>
+        <p:cNvGrpSpPr/>
+        <p:nvPr/>
+      </p:nvGrpSpPr>
+      <p:grpSpPr>
+        <a:xfrm>
+          <a:off x="0" y="0"/>
+          <a:ext cx="0" cy="0"/>
+          <a:chOff x="0" y="0"/>
+          <a:chExt cx="0" cy="0"/>
+        </a:xfrm>
+      </p:grpSpPr>
+      <p:sp>
+        <p:nvSpPr>
+          <p:cNvPr id="2" name="Title 1"/>
+          <p:cNvSpPr>
+            <a:spLocks noGrp="1"/>
+          </p:cNvSpPr>
+          <p:nvPr>
+            <p:ph type="title"/>
+          </p:nvPr>
+        </p:nvSpPr>
+        <p:spPr/>
+        <p:txBody>
+          <a:bodyPr/>
+          <a:lstStyle/>
+          <a:p>
+            <a:r>
+              <a:rPr lang="en-US" dirty="0" smtClean="0"/>
+              <a:t>Events</a:t>
+            </a:r>
+            <a:endParaRPr lang="en-US" dirty="0"/>
+          </a:p>
+        </p:txBody>
+      </p:sp>
+      <p:sp>
+        <p:nvSpPr>
+          <p:cNvPr id="3" name="Text Placeholder 2"/>
+          <p:cNvSpPr>
+            <a:spLocks noGrp="1"/>
+          </p:cNvSpPr>
+          <p:nvPr>
+            <p:ph type="body" idx="1"/>
+          </p:nvPr>
+        </p:nvSpPr>
+        <p:spPr/>
+        <p:txBody>
+          <a:bodyPr/>
+          <a:lstStyle/>
+          <a:p>
+            <a:r>
+              <a:rPr lang="en-US" dirty="0" err="1" smtClean="0"/>
+              <a:t>pageinit</a:t>
+            </a:r>
+            <a:endParaRPr lang="en-US" dirty="0" smtClean="0"/>
+          </a:p>
+          <a:p>
+            <a:r>
+              <a:rPr lang="en-US" dirty="0" err="1" smtClean="0"/>
+              <a:t>pagebeforeload</a:t>
+            </a:r>
+            <a:r>
+              <a:rPr lang="en-US" dirty="0" smtClean="0"/>
+              <a:t> / </a:t>
+            </a:r>
+            <a:r>
+              <a:rPr lang="en-US" dirty="0" err="1" smtClean="0"/>
+              <a:t>pageload</a:t>
+            </a:r>
+            <a:r>
+              <a:rPr lang="en-US" dirty="0" smtClean="0"/>
+              <a:t> / </a:t>
+            </a:r>
+            <a:r>
+              <a:rPr lang="en-US" dirty="0" err="1" smtClean="0"/>
+              <a:t>pageloadfailed</a:t>
+            </a:r>
+            <a:endParaRPr lang="en-US" dirty="0" smtClean="0"/>
+          </a:p>
+          <a:p>
+            <a:r>
+              <a:rPr lang="en-US" dirty="0" err="1" smtClean="0"/>
+              <a:t>pagebeforechange</a:t>
+            </a:r>
+            <a:r>
+              <a:rPr lang="en-US" dirty="0" smtClean="0"/>
+              <a:t> / </a:t>
+            </a:r>
+            <a:r>
+              <a:rPr lang="en-US" dirty="0" err="1" smtClean="0"/>
+              <a:t>pagechange</a:t>
+            </a:r>
+            <a:r>
+              <a:rPr lang="en-US" dirty="0" smtClean="0"/>
+              <a:t> / </a:t>
+            </a:r>
+            <a:r>
+              <a:rPr lang="en-US" dirty="0" err="1" smtClean="0"/>
+              <a:t>pagechangefailed</a:t>
+            </a:r>
+            <a:endParaRPr lang="en-US" dirty="0" smtClean="0"/>
+          </a:p>
+          <a:p>
+            <a:r>
+              <a:rPr lang="en-US" dirty="0" err="1" smtClean="0"/>
+              <a:t>pagebeforeshow</a:t>
+            </a:r>
+            <a:r>
+              <a:rPr lang="en-US" dirty="0" smtClean="0"/>
+              <a:t> / </a:t>
+            </a:r>
+            <a:r>
+              <a:rPr lang="en-US" dirty="0" err="1" smtClean="0"/>
+              <a:t>pagebeforehide</a:t>
+            </a:r>
+            <a:r>
+              <a:rPr lang="en-US" dirty="0" smtClean="0"/>
+              <a:t> / </a:t>
+            </a:r>
+            <a:r>
+              <a:rPr lang="en-US" dirty="0" err="1" smtClean="0"/>
+              <a:t>pageshow</a:t>
+            </a:r>
+            <a:endParaRPr lang="en-US" dirty="0" smtClean="0"/>
+          </a:p>
+          <a:p>
+            <a:r>
+              <a:rPr lang="en-US" dirty="0" err="1" smtClean="0"/>
+              <a:t>pagebeforecreate</a:t>
+            </a:r>
+            <a:r>
+              <a:rPr lang="en-US" dirty="0" smtClean="0"/>
+              <a:t> / </a:t>
+            </a:r>
+            <a:r>
+              <a:rPr lang="en-US" dirty="0" err="1" smtClean="0"/>
+              <a:t>pagecreate</a:t>
+            </a:r>
+            <a:r>
+              <a:rPr lang="en-US" dirty="0" smtClean="0"/>
+              <a:t> / </a:t>
+            </a:r>
+            <a:r>
+              <a:rPr lang="en-US" dirty="0" err="1" smtClean="0"/>
+              <a:t>pageinit</a:t>
+            </a:r>
+            <a:endParaRPr lang="en-US" dirty="0" smtClean="0"/>
+          </a:p>
+          <a:p>
+            <a:r>
+              <a:rPr lang="en-US" dirty="0" err="1" smtClean="0"/>
+              <a:t>pageremove</a:t>
+            </a:r>
+            <a:endParaRPr lang="en-US" dirty="0" smtClean="0"/>
+          </a:p>
+          <a:p>
+            <a:endParaRPr lang="en-US" dirty="0"/>
+          </a:p>
+        </p:txBody>
+      </p:sp>
+      <p:pic>
+        <p:nvPicPr>
+          <p:cNvPr id="15362" name="Picture 2"/>
+          <p:cNvPicPr>
+            <a:picLocks noChangeAspect="1" noChangeArrowheads="1"/>
+          </p:cNvPicPr>
+          <p:nvPr/>
+        </p:nvPicPr>
+        <p:blipFill>
+          <a:blip r:embed="rId2">
+            <a:extLst>
+              <a:ext uri="{28A0092B-C50C-407E-A947-70E740481C1C}">
+                <a14:useLocalDpi xmlns:a14="http://schemas.microsoft.com/office/drawing/2010/main" val="0"/>
+              </a:ext>
+            </a:extLst>
+          </a:blip>
+          <a:srcRect/>
+          <a:stretch>
+            <a:fillRect/>
+          </a:stretch>
+        </p:blipFill>
+        <p:spPr bwMode="auto">
+          <a:xfrm>
+            <a:off x="1278488" y="4495800"/>
+            <a:ext cx="6534150" cy="1200150"/>
+          </a:xfrm>
+          <a:prstGeom prst="rect">
+            <a:avLst/>
+          </a:prstGeom>
+          <a:noFill/>
+          <a:ln>
+            <a:noFill/>
+          </a:ln>
+          <a:effectLst/>
+          <a:extLst>
+            <a:ext uri="{909E8E84-426E-40DD-AFC4-6F175D3DCCD1}">
+              <a14:hiddenFill xmlns:a14="http://schemas.microsoft.com/office/drawing/2010/main">
+                <a:solidFill>
+                  <a:schemeClr val="accent1"/>
+                </a:solidFill>
+              </a14:hiddenFill>
+            </a:ext>
+            <a:ext uri="{91240B29-F687-4F45-9708-019B960494DF}">
+              <a14:hiddenLine xmlns:a14="http://schemas.microsoft.com/office/drawing/2010/main" w="9525">
+                <a:solidFill>
+                  <a:schemeClr val="tx1"/>
+                </a:solidFill>
+                <a:miter lim="800000"/>
+                <a:headEnd/>
+                <a:tailEnd/>
+              </a14:hiddenLine>
+            </a:ext>
+            <a:ext uri="{AF507438-7753-43E0-B8FC-AC1667EBCBE1}">
+              <a14:hiddenEffects xmlns:a14="http://schemas.microsoft.com/office/drawing/2010/main">
+                <a:effectLst>
+                  <a:outerShdw dist="35921" dir="2700000" algn="ctr" rotWithShape="0">
+                    <a:schemeClr val="bg2"/>
+                  </a:outerShdw>
+                </a:effectLst>
+              </a14:hiddenEffects>
+            </a:ext>
+          </a:extLst>
+        </p:spPr>
+      </p:pic>
+    </p:spTree>
+    <p:extLst>
+      <p:ext uri="{BB962C8B-B14F-4D97-AF65-F5344CB8AC3E}">
+        <p14:creationId xmlns:p14="http://schemas.microsoft.com/office/powerpoint/2010/main" val="3984987282"/>
+      </p:ext>
+    </p:extLst>
+  </p:cSld>
+  <p:clrMapOvr>
+    <a:masterClrMapping/>
+  </p:clrMapOvr>
+  <p:transition>
+    <p:fade/>
+  </p:transition>
+  <p:timing>
+    <p:tnLst>
+      <p:par>
+        <p:cTn id="1" dur="indefinite" restart="never" nodeType="tmRoot"/>
+      </p:par>
+    </p:tnLst>
+  </p:timing>
+</p:sld>
+</file>
+
+<file path=ppt/slides/slide23.xml><?xml version="1.0" encoding="utf-8"?>
+<p:sld xmlns:a="http://schemas.openxmlformats.org/drawingml/2006/main" xmlns:r="http://schemas.openxmlformats.org/officeDocument/2006/relationships" xmlns:p="http://schemas.openxmlformats.org/presentationml/2006/main">
+  <p:cSld>
+    <p:spTree>
+      <p:nvGrpSpPr>
+        <p:cNvPr id="1" name=""/>
+        <p:cNvGrpSpPr/>
+        <p:nvPr/>
+      </p:nvGrpSpPr>
+      <p:grpSpPr>
+        <a:xfrm>
+          <a:off x="0" y="0"/>
+          <a:ext cx="0" cy="0"/>
+          <a:chOff x="0" y="0"/>
+          <a:chExt cx="0" cy="0"/>
+        </a:xfrm>
+      </p:grpSpPr>
+      <p:sp>
+        <p:nvSpPr>
+          <p:cNvPr id="2" name="Title 1"/>
+          <p:cNvSpPr>
+            <a:spLocks noGrp="1"/>
+          </p:cNvSpPr>
+          <p:nvPr>
+            <p:ph type="title"/>
+          </p:nvPr>
+        </p:nvSpPr>
+        <p:spPr/>
+        <p:txBody>
+          <a:bodyPr/>
+          <a:lstStyle/>
+          <a:p>
+            <a:r>
+              <a:rPr lang="en-US" dirty="0" smtClean="0"/>
               <a:t>Working With Single Page</a:t>
             </a:r>
             <a:endParaRPr lang="en-US" dirty="0"/>
@@ -5541,7 +6014,7 @@
 </p:sld>
 </file>
 
-<file path=ppt/slides/slide21.xml><?xml version="1.0" encoding="utf-8"?>
+<file path=ppt/slides/slide24.xml><?xml version="1.0" encoding="utf-8"?>
 <p:sld xmlns:a="http://schemas.openxmlformats.org/drawingml/2006/main" xmlns:r="http://schemas.openxmlformats.org/officeDocument/2006/relationships" xmlns:p="http://schemas.openxmlformats.org/presentationml/2006/main">
   <p:cSld>
     <p:spTree>
@@ -5699,7 +6172,7 @@
 </p:sld>
 </file>
 
-<file path=ppt/slides/slide22.xml><?xml version="1.0" encoding="utf-8"?>
+<file path=ppt/slides/slide25.xml><?xml version="1.0" encoding="utf-8"?>
 <p:sld xmlns:a="http://schemas.openxmlformats.org/drawingml/2006/main" xmlns:r="http://schemas.openxmlformats.org/officeDocument/2006/relationships" xmlns:p="http://schemas.openxmlformats.org/presentationml/2006/main">
   <p:cSld>
     <p:spTree>
@@ -5842,7 +6315,7 @@
 </p:sld>
 </file>
 
-<file path=ppt/slides/slide23.xml><?xml version="1.0" encoding="utf-8"?>
+<file path=ppt/slides/slide26.xml><?xml version="1.0" encoding="utf-8"?>
 <p:sld xmlns:a="http://schemas.openxmlformats.org/drawingml/2006/main" xmlns:r="http://schemas.openxmlformats.org/officeDocument/2006/relationships" xmlns:p="http://schemas.openxmlformats.org/presentationml/2006/main">
   <p:cSld>
     <p:spTree>
@@ -6155,7 +6628,6 @@
               <a:rPr lang="en-US" dirty="0" smtClean="0"/>
               <a:t>Questions? </a:t>
             </a:r>
-            <a:endParaRPr lang="en-US" dirty="0" smtClean="0"/>
           </a:p>
           <a:p>
             <a:pPr lvl="1"/>
@@ -6186,6 +6658,1536 @@
 </file>
 
 <file path=ppt/slides/slide3.xml><?xml version="1.0" encoding="utf-8"?>
+<p:sld xmlns:a="http://schemas.openxmlformats.org/drawingml/2006/main" xmlns:r="http://schemas.openxmlformats.org/officeDocument/2006/relationships" xmlns:p="http://schemas.openxmlformats.org/presentationml/2006/main">
+  <p:cSld>
+    <p:spTree>
+      <p:nvGrpSpPr>
+        <p:cNvPr id="1" name=""/>
+        <p:cNvGrpSpPr/>
+        <p:nvPr/>
+      </p:nvGrpSpPr>
+      <p:grpSpPr>
+        <a:xfrm>
+          <a:off x="0" y="0"/>
+          <a:ext cx="0" cy="0"/>
+          <a:chOff x="0" y="0"/>
+          <a:chExt cx="0" cy="0"/>
+        </a:xfrm>
+      </p:grpSpPr>
+      <p:sp>
+        <p:nvSpPr>
+          <p:cNvPr id="2" name="Title 1"/>
+          <p:cNvSpPr>
+            <a:spLocks noGrp="1"/>
+          </p:cNvSpPr>
+          <p:nvPr>
+            <p:ph type="title"/>
+          </p:nvPr>
+        </p:nvSpPr>
+        <p:spPr/>
+        <p:txBody>
+          <a:bodyPr/>
+          <a:lstStyle/>
+          <a:p>
+            <a:r>
+              <a:rPr lang="en-US" dirty="0" smtClean="0"/>
+              <a:t>Mobile Project Template</a:t>
+            </a:r>
+            <a:endParaRPr lang="en-US" dirty="0"/>
+          </a:p>
+        </p:txBody>
+      </p:sp>
+      <p:sp>
+        <p:nvSpPr>
+          <p:cNvPr id="3" name="Text Placeholder 2"/>
+          <p:cNvSpPr>
+            <a:spLocks noGrp="1"/>
+          </p:cNvSpPr>
+          <p:nvPr>
+            <p:ph type="body" idx="1"/>
+          </p:nvPr>
+        </p:nvSpPr>
+        <p:spPr/>
+        <p:txBody>
+          <a:bodyPr/>
+          <a:lstStyle/>
+          <a:p>
+            <a:endParaRPr lang="en-US" dirty="0"/>
+          </a:p>
+        </p:txBody>
+      </p:sp>
+      <p:pic>
+        <p:nvPicPr>
+          <p:cNvPr id="1026" name="Picture 2"/>
+          <p:cNvPicPr>
+            <a:picLocks noChangeAspect="1" noChangeArrowheads="1"/>
+          </p:cNvPicPr>
+          <p:nvPr/>
+        </p:nvPicPr>
+        <p:blipFill>
+          <a:blip r:embed="rId2">
+            <a:extLst>
+              <a:ext uri="{28A0092B-C50C-407E-A947-70E740481C1C}">
+                <a14:useLocalDpi xmlns:a14="http://schemas.microsoft.com/office/drawing/2010/main" val="0"/>
+              </a:ext>
+            </a:extLst>
+          </a:blip>
+          <a:srcRect/>
+          <a:stretch>
+            <a:fillRect/>
+          </a:stretch>
+        </p:blipFill>
+        <p:spPr bwMode="auto">
+          <a:xfrm>
+            <a:off x="1338263" y="490538"/>
+            <a:ext cx="6467475" cy="5876925"/>
+          </a:xfrm>
+          <a:prstGeom prst="rect">
+            <a:avLst/>
+          </a:prstGeom>
+          <a:noFill/>
+          <a:ln>
+            <a:noFill/>
+          </a:ln>
+          <a:effectLst/>
+          <a:extLst>
+            <a:ext uri="{909E8E84-426E-40DD-AFC4-6F175D3DCCD1}">
+              <a14:hiddenFill xmlns:a14="http://schemas.microsoft.com/office/drawing/2010/main">
+                <a:solidFill>
+                  <a:schemeClr val="accent1"/>
+                </a:solidFill>
+              </a14:hiddenFill>
+            </a:ext>
+            <a:ext uri="{91240B29-F687-4F45-9708-019B960494DF}">
+              <a14:hiddenLine xmlns:a14="http://schemas.microsoft.com/office/drawing/2010/main" w="9525">
+                <a:solidFill>
+                  <a:schemeClr val="tx1"/>
+                </a:solidFill>
+                <a:miter lim="800000"/>
+                <a:headEnd/>
+                <a:tailEnd/>
+              </a14:hiddenLine>
+            </a:ext>
+            <a:ext uri="{AF507438-7753-43E0-B8FC-AC1667EBCBE1}">
+              <a14:hiddenEffects xmlns:a14="http://schemas.microsoft.com/office/drawing/2010/main">
+                <a:effectLst>
+                  <a:outerShdw dist="35921" dir="2700000" algn="ctr" rotWithShape="0">
+                    <a:schemeClr val="bg2"/>
+                  </a:outerShdw>
+                </a:effectLst>
+              </a14:hiddenEffects>
+            </a:ext>
+          </a:extLst>
+        </p:spPr>
+      </p:pic>
+    </p:spTree>
+    <p:extLst>
+      <p:ext uri="{BB962C8B-B14F-4D97-AF65-F5344CB8AC3E}">
+        <p14:creationId xmlns:p14="http://schemas.microsoft.com/office/powerpoint/2010/main" val="2452093455"/>
+      </p:ext>
+    </p:extLst>
+  </p:cSld>
+  <p:clrMapOvr>
+    <a:masterClrMapping/>
+  </p:clrMapOvr>
+  <p:transition>
+    <p:fade/>
+  </p:transition>
+  <p:timing>
+    <p:tnLst>
+      <p:par>
+        <p:cTn id="1" dur="indefinite" restart="never" nodeType="tmRoot"/>
+      </p:par>
+    </p:tnLst>
+  </p:timing>
+</p:sld>
+</file>
+
+<file path=ppt/slides/slide4.xml><?xml version="1.0" encoding="utf-8"?>
+<p:sld xmlns:a="http://schemas.openxmlformats.org/drawingml/2006/main" xmlns:r="http://schemas.openxmlformats.org/officeDocument/2006/relationships" xmlns:p="http://schemas.openxmlformats.org/presentationml/2006/main">
+  <p:cSld>
+    <p:spTree>
+      <p:nvGrpSpPr>
+        <p:cNvPr id="1" name=""/>
+        <p:cNvGrpSpPr/>
+        <p:nvPr/>
+      </p:nvGrpSpPr>
+      <p:grpSpPr>
+        <a:xfrm>
+          <a:off x="0" y="0"/>
+          <a:ext cx="0" cy="0"/>
+          <a:chOff x="0" y="0"/>
+          <a:chExt cx="0" cy="0"/>
+        </a:xfrm>
+      </p:grpSpPr>
+      <p:sp>
+        <p:nvSpPr>
+          <p:cNvPr id="2" name="Title 1"/>
+          <p:cNvSpPr>
+            <a:spLocks noGrp="1"/>
+          </p:cNvSpPr>
+          <p:nvPr>
+            <p:ph type="title"/>
+          </p:nvPr>
+        </p:nvSpPr>
+        <p:spPr/>
+        <p:txBody>
+          <a:bodyPr/>
+          <a:lstStyle/>
+          <a:p>
+            <a:r>
+              <a:rPr lang="en-US" dirty="0" smtClean="0"/>
+              <a:t>Display Modes</a:t>
+            </a:r>
+            <a:endParaRPr lang="en-US" dirty="0"/>
+          </a:p>
+        </p:txBody>
+      </p:sp>
+      <p:sp>
+        <p:nvSpPr>
+          <p:cNvPr id="3" name="Text Placeholder 2"/>
+          <p:cNvSpPr>
+            <a:spLocks noGrp="1"/>
+          </p:cNvSpPr>
+          <p:nvPr>
+            <p:ph type="body" idx="1"/>
+          </p:nvPr>
+        </p:nvSpPr>
+        <p:spPr/>
+        <p:txBody>
+          <a:bodyPr/>
+          <a:lstStyle/>
+          <a:p>
+            <a:r>
+              <a:rPr lang="en-US" dirty="0" smtClean="0"/>
+              <a:t>View rendered depends on browser making the request</a:t>
+            </a:r>
+          </a:p>
+          <a:p>
+            <a:pPr lvl="1"/>
+            <a:r>
+              <a:rPr lang="en-US" dirty="0" smtClean="0"/>
+              <a:t>Applies to layout, content, and partial views</a:t>
+            </a:r>
+            <a:endParaRPr lang="en-US" dirty="0"/>
+          </a:p>
+        </p:txBody>
+      </p:sp>
+      <p:sp>
+        <p:nvSpPr>
+          <p:cNvPr id="4" name="Rectangle 3"/>
+          <p:cNvSpPr/>
+          <p:nvPr/>
+        </p:nvSpPr>
+        <p:spPr bwMode="auto">
+          <a:xfrm>
+            <a:off x="685800" y="3657600"/>
+            <a:ext cx="1676400" cy="1219200"/>
+          </a:xfrm>
+          <a:prstGeom prst="rect">
+            <a:avLst/>
+          </a:prstGeom>
+          <a:gradFill rotWithShape="1">
+            <a:gsLst>
+              <a:gs pos="0">
+                <a:srgbClr val="A4D289"/>
+              </a:gs>
+              <a:gs pos="100000">
+                <a:schemeClr val="bg1"/>
+              </a:gs>
+            </a:gsLst>
+            <a:lin ang="5400000" scaled="1"/>
+          </a:gradFill>
+          <a:ln w="9525" algn="ctr">
+            <a:solidFill>
+              <a:schemeClr val="tx1"/>
+            </a:solidFill>
+            <a:miter lim="800000"/>
+            <a:headEnd/>
+            <a:tailEnd/>
+          </a:ln>
+          <a:effectLst>
+            <a:outerShdw blurRad="50800" dist="38100" dir="2700000" algn="tl" rotWithShape="0">
+              <a:prstClr val="black">
+                <a:alpha val="40000"/>
+              </a:prstClr>
+            </a:outerShdw>
+          </a:effectLst>
+        </p:spPr>
+        <p:txBody>
+          <a:bodyPr wrap="none" rtlCol="0" anchor="ctr"/>
+          <a:lstStyle/>
+          <a:p>
+            <a:pPr algn="ctr"/>
+            <a:r>
+              <a:rPr lang="en-US" sz="2000" dirty="0" smtClean="0">
+                <a:latin typeface="Tekton Pro" pitchFamily="34" charset="0"/>
+              </a:rPr>
+              <a:t>Controller</a:t>
+            </a:r>
+            <a:endParaRPr lang="en-US" sz="2000" dirty="0">
+              <a:latin typeface="Tekton Pro" pitchFamily="34" charset="0"/>
+            </a:endParaRPr>
+          </a:p>
+        </p:txBody>
+      </p:sp>
+      <p:sp>
+        <p:nvSpPr>
+          <p:cNvPr id="7" name="Rectangle 6"/>
+          <p:cNvSpPr/>
+          <p:nvPr/>
+        </p:nvSpPr>
+        <p:spPr bwMode="auto">
+          <a:xfrm>
+            <a:off x="3429000" y="3657600"/>
+            <a:ext cx="1676400" cy="1219200"/>
+          </a:xfrm>
+          <a:prstGeom prst="rect">
+            <a:avLst/>
+          </a:prstGeom>
+          <a:gradFill rotWithShape="1">
+            <a:gsLst>
+              <a:gs pos="0">
+                <a:srgbClr val="A4D289"/>
+              </a:gs>
+              <a:gs pos="100000">
+                <a:schemeClr val="bg1"/>
+              </a:gs>
+            </a:gsLst>
+            <a:lin ang="5400000" scaled="1"/>
+          </a:gradFill>
+          <a:ln w="9525" algn="ctr">
+            <a:solidFill>
+              <a:schemeClr val="tx1"/>
+            </a:solidFill>
+            <a:miter lim="800000"/>
+            <a:headEnd/>
+            <a:tailEnd/>
+          </a:ln>
+          <a:effectLst>
+            <a:outerShdw blurRad="50800" dist="38100" dir="2700000" algn="tl" rotWithShape="0">
+              <a:prstClr val="black">
+                <a:alpha val="40000"/>
+              </a:prstClr>
+            </a:outerShdw>
+          </a:effectLst>
+        </p:spPr>
+        <p:txBody>
+          <a:bodyPr wrap="none" rtlCol="0" anchor="ctr"/>
+          <a:lstStyle/>
+          <a:p>
+            <a:pPr algn="ctr"/>
+            <a:r>
+              <a:rPr lang="en-US" sz="2000" dirty="0" err="1" smtClean="0">
+                <a:latin typeface="Tekton Pro" pitchFamily="34" charset="0"/>
+              </a:rPr>
+              <a:t>IsMobile</a:t>
+            </a:r>
+            <a:r>
+              <a:rPr lang="en-US" sz="2000" dirty="0" smtClean="0">
+                <a:latin typeface="Tekton Pro" pitchFamily="34" charset="0"/>
+              </a:rPr>
+              <a:t>?</a:t>
+            </a:r>
+            <a:endParaRPr lang="en-US" sz="2000" dirty="0">
+              <a:latin typeface="Tekton Pro" pitchFamily="34" charset="0"/>
+            </a:endParaRPr>
+          </a:p>
+        </p:txBody>
+      </p:sp>
+      <p:sp>
+        <p:nvSpPr>
+          <p:cNvPr id="8" name="Rectangle 7"/>
+          <p:cNvSpPr/>
+          <p:nvPr/>
+        </p:nvSpPr>
+        <p:spPr bwMode="auto">
+          <a:xfrm>
+            <a:off x="6019800" y="2438400"/>
+            <a:ext cx="1676400" cy="1219200"/>
+          </a:xfrm>
+          <a:prstGeom prst="rect">
+            <a:avLst/>
+          </a:prstGeom>
+          <a:gradFill rotWithShape="1">
+            <a:gsLst>
+              <a:gs pos="0">
+                <a:srgbClr val="A4D289"/>
+              </a:gs>
+              <a:gs pos="100000">
+                <a:schemeClr val="bg1"/>
+              </a:gs>
+            </a:gsLst>
+            <a:lin ang="5400000" scaled="1"/>
+          </a:gradFill>
+          <a:ln w="9525" algn="ctr">
+            <a:solidFill>
+              <a:schemeClr val="tx1"/>
+            </a:solidFill>
+            <a:miter lim="800000"/>
+            <a:headEnd/>
+            <a:tailEnd/>
+          </a:ln>
+          <a:effectLst>
+            <a:outerShdw blurRad="50800" dist="38100" dir="2700000" algn="tl" rotWithShape="0">
+              <a:prstClr val="black">
+                <a:alpha val="40000"/>
+              </a:prstClr>
+            </a:outerShdw>
+          </a:effectLst>
+        </p:spPr>
+        <p:txBody>
+          <a:bodyPr wrap="none" rtlCol="0" anchor="ctr"/>
+          <a:lstStyle/>
+          <a:p>
+            <a:pPr algn="ctr"/>
+            <a:r>
+              <a:rPr lang="en-US" sz="1400" dirty="0" err="1" smtClean="0">
+                <a:latin typeface="Tekton Pro" pitchFamily="34" charset="0"/>
+              </a:rPr>
+              <a:t>Index.mobile.cshtml</a:t>
+            </a:r>
+            <a:endParaRPr lang="en-US" sz="1400" dirty="0">
+              <a:latin typeface="Tekton Pro" pitchFamily="34" charset="0"/>
+            </a:endParaRPr>
+          </a:p>
+        </p:txBody>
+      </p:sp>
+      <p:sp>
+        <p:nvSpPr>
+          <p:cNvPr id="9" name="Rectangle 8"/>
+          <p:cNvSpPr/>
+          <p:nvPr/>
+        </p:nvSpPr>
+        <p:spPr bwMode="auto">
+          <a:xfrm>
+            <a:off x="6019800" y="4876800"/>
+            <a:ext cx="1676400" cy="1219200"/>
+          </a:xfrm>
+          <a:prstGeom prst="rect">
+            <a:avLst/>
+          </a:prstGeom>
+          <a:gradFill rotWithShape="1">
+            <a:gsLst>
+              <a:gs pos="0">
+                <a:srgbClr val="A4D289"/>
+              </a:gs>
+              <a:gs pos="100000">
+                <a:schemeClr val="bg1"/>
+              </a:gs>
+            </a:gsLst>
+            <a:lin ang="5400000" scaled="1"/>
+          </a:gradFill>
+          <a:ln w="9525" algn="ctr">
+            <a:solidFill>
+              <a:schemeClr val="tx1"/>
+            </a:solidFill>
+            <a:miter lim="800000"/>
+            <a:headEnd/>
+            <a:tailEnd/>
+          </a:ln>
+          <a:effectLst>
+            <a:outerShdw blurRad="50800" dist="38100" dir="2700000" algn="tl" rotWithShape="0">
+              <a:prstClr val="black">
+                <a:alpha val="40000"/>
+              </a:prstClr>
+            </a:outerShdw>
+          </a:effectLst>
+        </p:spPr>
+        <p:txBody>
+          <a:bodyPr wrap="none" rtlCol="0" anchor="ctr"/>
+          <a:lstStyle/>
+          <a:p>
+            <a:pPr algn="ctr"/>
+            <a:r>
+              <a:rPr lang="en-US" sz="1400" dirty="0" err="1" smtClean="0">
+                <a:latin typeface="Tekton Pro" pitchFamily="34" charset="0"/>
+              </a:rPr>
+              <a:t>Index.cshtml</a:t>
+            </a:r>
+            <a:endParaRPr lang="en-US" sz="1400" dirty="0">
+              <a:latin typeface="Tekton Pro" pitchFamily="34" charset="0"/>
+            </a:endParaRPr>
+          </a:p>
+        </p:txBody>
+      </p:sp>
+      <p:sp>
+        <p:nvSpPr>
+          <p:cNvPr id="11" name="Right Arrow 10"/>
+          <p:cNvSpPr/>
+          <p:nvPr/>
+        </p:nvSpPr>
+        <p:spPr bwMode="auto">
+          <a:xfrm>
+            <a:off x="2362200" y="4038600"/>
+            <a:ext cx="1066800" cy="457200"/>
+          </a:xfrm>
+          <a:prstGeom prst="rightArrow">
+            <a:avLst/>
+          </a:prstGeom>
+          <a:ln>
+            <a:headEnd/>
+            <a:tailEnd/>
+          </a:ln>
+        </p:spPr>
+        <p:style>
+          <a:lnRef idx="1">
+            <a:schemeClr val="accent3"/>
+          </a:lnRef>
+          <a:fillRef idx="2">
+            <a:schemeClr val="accent3"/>
+          </a:fillRef>
+          <a:effectRef idx="1">
+            <a:schemeClr val="accent3"/>
+          </a:effectRef>
+          <a:fontRef idx="minor">
+            <a:schemeClr val="dk1"/>
+          </a:fontRef>
+        </p:style>
+        <p:txBody>
+          <a:bodyPr wrap="none" rtlCol="0" anchor="ctr"/>
+          <a:lstStyle/>
+          <a:p>
+            <a:pPr algn="ctr"/>
+            <a:r>
+              <a:rPr lang="en-US" sz="1400" dirty="0" smtClean="0">
+                <a:latin typeface="Tekton Pro" pitchFamily="34" charset="0"/>
+              </a:rPr>
+              <a:t>Index</a:t>
+            </a:r>
+            <a:endParaRPr lang="en-US" sz="1400" dirty="0">
+              <a:latin typeface="Tekton Pro" pitchFamily="34" charset="0"/>
+            </a:endParaRPr>
+          </a:p>
+        </p:txBody>
+      </p:sp>
+      <p:sp>
+        <p:nvSpPr>
+          <p:cNvPr id="12" name="Right Arrow 11"/>
+          <p:cNvSpPr/>
+          <p:nvPr/>
+        </p:nvSpPr>
+        <p:spPr bwMode="auto">
+          <a:xfrm rot="20059156">
+            <a:off x="5073315" y="3248502"/>
+            <a:ext cx="1066800" cy="457200"/>
+          </a:xfrm>
+          <a:prstGeom prst="rightArrow">
+            <a:avLst/>
+          </a:prstGeom>
+          <a:ln>
+            <a:headEnd/>
+            <a:tailEnd/>
+          </a:ln>
+        </p:spPr>
+        <p:style>
+          <a:lnRef idx="1">
+            <a:schemeClr val="accent3"/>
+          </a:lnRef>
+          <a:fillRef idx="2">
+            <a:schemeClr val="accent3"/>
+          </a:fillRef>
+          <a:effectRef idx="1">
+            <a:schemeClr val="accent3"/>
+          </a:effectRef>
+          <a:fontRef idx="minor">
+            <a:schemeClr val="dk1"/>
+          </a:fontRef>
+        </p:style>
+        <p:txBody>
+          <a:bodyPr wrap="none" rtlCol="0" anchor="ctr"/>
+          <a:lstStyle/>
+          <a:p>
+            <a:pPr algn="ctr"/>
+            <a:r>
+              <a:rPr lang="en-US" sz="1400" dirty="0" smtClean="0">
+                <a:latin typeface="Tekton Pro" pitchFamily="34" charset="0"/>
+              </a:rPr>
+              <a:t>true</a:t>
+            </a:r>
+            <a:endParaRPr lang="en-US" sz="1400" dirty="0">
+              <a:latin typeface="Tekton Pro" pitchFamily="34" charset="0"/>
+            </a:endParaRPr>
+          </a:p>
+        </p:txBody>
+      </p:sp>
+      <p:sp>
+        <p:nvSpPr>
+          <p:cNvPr id="13" name="Right Arrow 12"/>
+          <p:cNvSpPr/>
+          <p:nvPr/>
+        </p:nvSpPr>
+        <p:spPr bwMode="auto">
+          <a:xfrm rot="1586471">
+            <a:off x="5040846" y="4937998"/>
+            <a:ext cx="1066800" cy="457200"/>
+          </a:xfrm>
+          <a:prstGeom prst="rightArrow">
+            <a:avLst/>
+          </a:prstGeom>
+          <a:ln>
+            <a:headEnd/>
+            <a:tailEnd/>
+          </a:ln>
+        </p:spPr>
+        <p:style>
+          <a:lnRef idx="1">
+            <a:schemeClr val="accent3"/>
+          </a:lnRef>
+          <a:fillRef idx="2">
+            <a:schemeClr val="accent3"/>
+          </a:fillRef>
+          <a:effectRef idx="1">
+            <a:schemeClr val="accent3"/>
+          </a:effectRef>
+          <a:fontRef idx="minor">
+            <a:schemeClr val="dk1"/>
+          </a:fontRef>
+        </p:style>
+        <p:txBody>
+          <a:bodyPr wrap="none" rtlCol="0" anchor="ctr"/>
+          <a:lstStyle/>
+          <a:p>
+            <a:pPr algn="ctr"/>
+            <a:r>
+              <a:rPr lang="en-US" sz="1400" dirty="0" smtClean="0">
+                <a:latin typeface="Tekton Pro" pitchFamily="34" charset="0"/>
+              </a:rPr>
+              <a:t>false</a:t>
+            </a:r>
+            <a:endParaRPr lang="en-US" sz="1400" dirty="0">
+              <a:latin typeface="Tekton Pro" pitchFamily="34" charset="0"/>
+            </a:endParaRPr>
+          </a:p>
+        </p:txBody>
+      </p:sp>
+    </p:spTree>
+    <p:extLst>
+      <p:ext uri="{BB962C8B-B14F-4D97-AF65-F5344CB8AC3E}">
+        <p14:creationId xmlns:p14="http://schemas.microsoft.com/office/powerpoint/2010/main" val="2656932840"/>
+      </p:ext>
+    </p:extLst>
+  </p:cSld>
+  <p:clrMapOvr>
+    <a:masterClrMapping/>
+  </p:clrMapOvr>
+  <p:transition>
+    <p:fade/>
+  </p:transition>
+  <p:timing>
+    <p:tnLst>
+      <p:par>
+        <p:cTn id="1" dur="indefinite" restart="never" nodeType="tmRoot">
+          <p:childTnLst>
+            <p:seq concurrent="1" nextAc="seek">
+              <p:cTn id="2" dur="indefinite" nodeType="mainSeq">
+                <p:childTnLst>
+                  <p:par>
+                    <p:cTn id="3" fill="hold">
+                      <p:stCondLst>
+                        <p:cond delay="indefinite"/>
+                      </p:stCondLst>
+                      <p:childTnLst>
+                        <p:par>
+                          <p:cTn id="4" fill="hold">
+                            <p:stCondLst>
+                              <p:cond delay="0"/>
+                            </p:stCondLst>
+                            <p:childTnLst>
+                              <p:par>
+                                <p:cTn id="5" presetID="10" presetClass="entr" presetSubtype="0" fill="hold" grpId="0" nodeType="clickEffect">
+                                  <p:stCondLst>
+                                    <p:cond delay="0"/>
+                                  </p:stCondLst>
+                                  <p:childTnLst>
+                                    <p:set>
+                                      <p:cBhvr>
+                                        <p:cTn id="6" dur="1" fill="hold">
+                                          <p:stCondLst>
+                                            <p:cond delay="0"/>
+                                          </p:stCondLst>
+                                        </p:cTn>
+                                        <p:tgtEl>
+                                          <p:spTgt spid="8"/>
+                                        </p:tgtEl>
+                                        <p:attrNameLst>
+                                          <p:attrName>style.visibility</p:attrName>
+                                        </p:attrNameLst>
+                                      </p:cBhvr>
+                                      <p:to>
+                                        <p:strVal val="visible"/>
+                                      </p:to>
+                                    </p:set>
+                                    <p:animEffect transition="in" filter="fade">
+                                      <p:cBhvr>
+                                        <p:cTn id="7" dur="500"/>
+                                        <p:tgtEl>
+                                          <p:spTgt spid="8"/>
+                                        </p:tgtEl>
+                                      </p:cBhvr>
+                                    </p:animEffect>
+                                  </p:childTnLst>
+                                </p:cTn>
+                              </p:par>
+                              <p:par>
+                                <p:cTn id="8" presetID="10" presetClass="entr" presetSubtype="0" fill="hold" grpId="0" nodeType="withEffect">
+                                  <p:stCondLst>
+                                    <p:cond delay="0"/>
+                                  </p:stCondLst>
+                                  <p:childTnLst>
+                                    <p:set>
+                                      <p:cBhvr>
+                                        <p:cTn id="9" dur="1" fill="hold">
+                                          <p:stCondLst>
+                                            <p:cond delay="0"/>
+                                          </p:stCondLst>
+                                        </p:cTn>
+                                        <p:tgtEl>
+                                          <p:spTgt spid="9"/>
+                                        </p:tgtEl>
+                                        <p:attrNameLst>
+                                          <p:attrName>style.visibility</p:attrName>
+                                        </p:attrNameLst>
+                                      </p:cBhvr>
+                                      <p:to>
+                                        <p:strVal val="visible"/>
+                                      </p:to>
+                                    </p:set>
+                                    <p:animEffect transition="in" filter="fade">
+                                      <p:cBhvr>
+                                        <p:cTn id="10" dur="500"/>
+                                        <p:tgtEl>
+                                          <p:spTgt spid="9"/>
+                                        </p:tgtEl>
+                                      </p:cBhvr>
+                                    </p:animEffect>
+                                  </p:childTnLst>
+                                </p:cTn>
+                              </p:par>
+                            </p:childTnLst>
+                          </p:cTn>
+                        </p:par>
+                      </p:childTnLst>
+                    </p:cTn>
+                  </p:par>
+                  <p:par>
+                    <p:cTn id="11" fill="hold">
+                      <p:stCondLst>
+                        <p:cond delay="indefinite"/>
+                      </p:stCondLst>
+                      <p:childTnLst>
+                        <p:par>
+                          <p:cTn id="12" fill="hold">
+                            <p:stCondLst>
+                              <p:cond delay="0"/>
+                            </p:stCondLst>
+                            <p:childTnLst>
+                              <p:par>
+                                <p:cTn id="13" presetID="1" presetClass="entr" presetSubtype="0" fill="hold" grpId="0" nodeType="clickEffect">
+                                  <p:stCondLst>
+                                    <p:cond delay="0"/>
+                                  </p:stCondLst>
+                                  <p:childTnLst>
+                                    <p:set>
+                                      <p:cBhvr>
+                                        <p:cTn id="14" dur="1" fill="hold">
+                                          <p:stCondLst>
+                                            <p:cond delay="0"/>
+                                          </p:stCondLst>
+                                        </p:cTn>
+                                        <p:tgtEl>
+                                          <p:spTgt spid="4"/>
+                                        </p:tgtEl>
+                                        <p:attrNameLst>
+                                          <p:attrName>style.visibility</p:attrName>
+                                        </p:attrNameLst>
+                                      </p:cBhvr>
+                                      <p:to>
+                                        <p:strVal val="visible"/>
+                                      </p:to>
+                                    </p:set>
+                                  </p:childTnLst>
+                                </p:cTn>
+                              </p:par>
+                            </p:childTnLst>
+                          </p:cTn>
+                        </p:par>
+                      </p:childTnLst>
+                    </p:cTn>
+                  </p:par>
+                  <p:par>
+                    <p:cTn id="15" fill="hold">
+                      <p:stCondLst>
+                        <p:cond delay="indefinite"/>
+                      </p:stCondLst>
+                      <p:childTnLst>
+                        <p:par>
+                          <p:cTn id="16" fill="hold">
+                            <p:stCondLst>
+                              <p:cond delay="0"/>
+                            </p:stCondLst>
+                            <p:childTnLst>
+                              <p:par>
+                                <p:cTn id="17" presetID="1" presetClass="entr" presetSubtype="0" fill="hold" grpId="0" nodeType="clickEffect">
+                                  <p:stCondLst>
+                                    <p:cond delay="0"/>
+                                  </p:stCondLst>
+                                  <p:childTnLst>
+                                    <p:set>
+                                      <p:cBhvr>
+                                        <p:cTn id="18" dur="1" fill="hold">
+                                          <p:stCondLst>
+                                            <p:cond delay="0"/>
+                                          </p:stCondLst>
+                                        </p:cTn>
+                                        <p:tgtEl>
+                                          <p:spTgt spid="11"/>
+                                        </p:tgtEl>
+                                        <p:attrNameLst>
+                                          <p:attrName>style.visibility</p:attrName>
+                                        </p:attrNameLst>
+                                      </p:cBhvr>
+                                      <p:to>
+                                        <p:strVal val="visible"/>
+                                      </p:to>
+                                    </p:set>
+                                  </p:childTnLst>
+                                </p:cTn>
+                              </p:par>
+                            </p:childTnLst>
+                          </p:cTn>
+                        </p:par>
+                      </p:childTnLst>
+                    </p:cTn>
+                  </p:par>
+                  <p:par>
+                    <p:cTn id="19" fill="hold">
+                      <p:stCondLst>
+                        <p:cond delay="indefinite"/>
+                      </p:stCondLst>
+                      <p:childTnLst>
+                        <p:par>
+                          <p:cTn id="20" fill="hold">
+                            <p:stCondLst>
+                              <p:cond delay="0"/>
+                            </p:stCondLst>
+                            <p:childTnLst>
+                              <p:par>
+                                <p:cTn id="21" presetID="10" presetClass="entr" presetSubtype="0" fill="hold" grpId="0" nodeType="clickEffect">
+                                  <p:stCondLst>
+                                    <p:cond delay="0"/>
+                                  </p:stCondLst>
+                                  <p:childTnLst>
+                                    <p:set>
+                                      <p:cBhvr>
+                                        <p:cTn id="22" dur="1" fill="hold">
+                                          <p:stCondLst>
+                                            <p:cond delay="0"/>
+                                          </p:stCondLst>
+                                        </p:cTn>
+                                        <p:tgtEl>
+                                          <p:spTgt spid="7"/>
+                                        </p:tgtEl>
+                                        <p:attrNameLst>
+                                          <p:attrName>style.visibility</p:attrName>
+                                        </p:attrNameLst>
+                                      </p:cBhvr>
+                                      <p:to>
+                                        <p:strVal val="visible"/>
+                                      </p:to>
+                                    </p:set>
+                                    <p:animEffect transition="in" filter="fade">
+                                      <p:cBhvr>
+                                        <p:cTn id="23" dur="500"/>
+                                        <p:tgtEl>
+                                          <p:spTgt spid="7"/>
+                                        </p:tgtEl>
+                                      </p:cBhvr>
+                                    </p:animEffect>
+                                  </p:childTnLst>
+                                </p:cTn>
+                              </p:par>
+                            </p:childTnLst>
+                          </p:cTn>
+                        </p:par>
+                      </p:childTnLst>
+                    </p:cTn>
+                  </p:par>
+                  <p:par>
+                    <p:cTn id="24" fill="hold">
+                      <p:stCondLst>
+                        <p:cond delay="indefinite"/>
+                      </p:stCondLst>
+                      <p:childTnLst>
+                        <p:par>
+                          <p:cTn id="25" fill="hold">
+                            <p:stCondLst>
+                              <p:cond delay="0"/>
+                            </p:stCondLst>
+                            <p:childTnLst>
+                              <p:par>
+                                <p:cTn id="26" presetID="10" presetClass="entr" presetSubtype="0" fill="hold" grpId="0" nodeType="clickEffect">
+                                  <p:stCondLst>
+                                    <p:cond delay="0"/>
+                                  </p:stCondLst>
+                                  <p:childTnLst>
+                                    <p:set>
+                                      <p:cBhvr>
+                                        <p:cTn id="27" dur="1" fill="hold">
+                                          <p:stCondLst>
+                                            <p:cond delay="0"/>
+                                          </p:stCondLst>
+                                        </p:cTn>
+                                        <p:tgtEl>
+                                          <p:spTgt spid="12"/>
+                                        </p:tgtEl>
+                                        <p:attrNameLst>
+                                          <p:attrName>style.visibility</p:attrName>
+                                        </p:attrNameLst>
+                                      </p:cBhvr>
+                                      <p:to>
+                                        <p:strVal val="visible"/>
+                                      </p:to>
+                                    </p:set>
+                                    <p:animEffect transition="in" filter="fade">
+                                      <p:cBhvr>
+                                        <p:cTn id="28" dur="500"/>
+                                        <p:tgtEl>
+                                          <p:spTgt spid="12"/>
+                                        </p:tgtEl>
+                                      </p:cBhvr>
+                                    </p:animEffect>
+                                  </p:childTnLst>
+                                </p:cTn>
+                              </p:par>
+                            </p:childTnLst>
+                          </p:cTn>
+                        </p:par>
+                      </p:childTnLst>
+                    </p:cTn>
+                  </p:par>
+                  <p:par>
+                    <p:cTn id="29" fill="hold">
+                      <p:stCondLst>
+                        <p:cond delay="indefinite"/>
+                      </p:stCondLst>
+                      <p:childTnLst>
+                        <p:par>
+                          <p:cTn id="30" fill="hold">
+                            <p:stCondLst>
+                              <p:cond delay="0"/>
+                            </p:stCondLst>
+                            <p:childTnLst>
+                              <p:par>
+                                <p:cTn id="31" presetID="10" presetClass="entr" presetSubtype="0" fill="hold" grpId="0" nodeType="clickEffect">
+                                  <p:stCondLst>
+                                    <p:cond delay="0"/>
+                                  </p:stCondLst>
+                                  <p:childTnLst>
+                                    <p:set>
+                                      <p:cBhvr>
+                                        <p:cTn id="32" dur="1" fill="hold">
+                                          <p:stCondLst>
+                                            <p:cond delay="0"/>
+                                          </p:stCondLst>
+                                        </p:cTn>
+                                        <p:tgtEl>
+                                          <p:spTgt spid="13"/>
+                                        </p:tgtEl>
+                                        <p:attrNameLst>
+                                          <p:attrName>style.visibility</p:attrName>
+                                        </p:attrNameLst>
+                                      </p:cBhvr>
+                                      <p:to>
+                                        <p:strVal val="visible"/>
+                                      </p:to>
+                                    </p:set>
+                                    <p:animEffect transition="in" filter="fade">
+                                      <p:cBhvr>
+                                        <p:cTn id="33" dur="500"/>
+                                        <p:tgtEl>
+                                          <p:spTgt spid="13"/>
+                                        </p:tgtEl>
+                                      </p:cBhvr>
+                                    </p:animEffect>
+                                  </p:childTnLst>
+                                </p:cTn>
+                              </p:par>
+                            </p:childTnLst>
+                          </p:cTn>
+                        </p:par>
+                      </p:childTnLst>
+                    </p:cTn>
+                  </p:par>
+                  <p:par>
+                    <p:cTn id="34" fill="hold">
+                      <p:stCondLst>
+                        <p:cond delay="indefinite"/>
+                      </p:stCondLst>
+                      <p:childTnLst>
+                        <p:par>
+                          <p:cTn id="35" fill="hold">
+                            <p:stCondLst>
+                              <p:cond delay="0"/>
+                            </p:stCondLst>
+                            <p:childTnLst>
+                              <p:par>
+                                <p:cTn id="36" presetID="10" presetClass="entr" presetSubtype="0" fill="hold" nodeType="clickEffect">
+                                  <p:stCondLst>
+                                    <p:cond delay="0"/>
+                                  </p:stCondLst>
+                                  <p:childTnLst>
+                                    <p:set>
+                                      <p:cBhvr>
+                                        <p:cTn id="37" dur="1" fill="hold">
+                                          <p:stCondLst>
+                                            <p:cond delay="0"/>
+                                          </p:stCondLst>
+                                        </p:cTn>
+                                        <p:tgtEl>
+                                          <p:spTgt spid="3">
+                                            <p:txEl>
+                                              <p:pRg st="1" end="1"/>
+                                            </p:txEl>
+                                          </p:spTgt>
+                                        </p:tgtEl>
+                                        <p:attrNameLst>
+                                          <p:attrName>style.visibility</p:attrName>
+                                        </p:attrNameLst>
+                                      </p:cBhvr>
+                                      <p:to>
+                                        <p:strVal val="visible"/>
+                                      </p:to>
+                                    </p:set>
+                                    <p:animEffect transition="in" filter="fade">
+                                      <p:cBhvr>
+                                        <p:cTn id="38" dur="500"/>
+                                        <p:tgtEl>
+                                          <p:spTgt spid="3">
+                                            <p:txEl>
+                                              <p:pRg st="1" end="1"/>
+                                            </p:txEl>
+                                          </p:spTgt>
+                                        </p:tgtEl>
+                                      </p:cBhvr>
+                                    </p:animEffect>
+                                  </p:childTnLst>
+                                </p:cTn>
+                              </p:par>
+                            </p:childTnLst>
+                          </p:cTn>
+                        </p:par>
+                      </p:childTnLst>
+                    </p:cTn>
+                  </p:par>
+                </p:childTnLst>
+              </p:cTn>
+              <p:prevCondLst>
+                <p:cond evt="onPrev" delay="0">
+                  <p:tgtEl>
+                    <p:sldTgt/>
+                  </p:tgtEl>
+                </p:cond>
+              </p:prevCondLst>
+              <p:nextCondLst>
+                <p:cond evt="onNext" delay="0">
+                  <p:tgtEl>
+                    <p:sldTgt/>
+                  </p:tgtEl>
+                </p:cond>
+              </p:nextCondLst>
+            </p:seq>
+          </p:childTnLst>
+        </p:cTn>
+      </p:par>
+    </p:tnLst>
+    <p:bldLst>
+      <p:bldP spid="4" grpId="0" animBg="1"/>
+      <p:bldP spid="7" grpId="0" animBg="1"/>
+      <p:bldP spid="8" grpId="0" animBg="1"/>
+      <p:bldP spid="9" grpId="0" animBg="1"/>
+      <p:bldP spid="11" grpId="0" animBg="1"/>
+      <p:bldP spid="12" grpId="0" animBg="1"/>
+      <p:bldP spid="13" grpId="0" animBg="1"/>
+    </p:bldLst>
+  </p:timing>
+</p:sld>
+</file>
+
+<file path=ppt/slides/slide5.xml><?xml version="1.0" encoding="utf-8"?>
+<p:sld xmlns:a="http://schemas.openxmlformats.org/drawingml/2006/main" xmlns:r="http://schemas.openxmlformats.org/officeDocument/2006/relationships" xmlns:p="http://schemas.openxmlformats.org/presentationml/2006/main">
+  <p:cSld>
+    <p:spTree>
+      <p:nvGrpSpPr>
+        <p:cNvPr id="1" name=""/>
+        <p:cNvGrpSpPr/>
+        <p:nvPr/>
+      </p:nvGrpSpPr>
+      <p:grpSpPr>
+        <a:xfrm>
+          <a:off x="0" y="0"/>
+          <a:ext cx="0" cy="0"/>
+          <a:chOff x="0" y="0"/>
+          <a:chExt cx="0" cy="0"/>
+        </a:xfrm>
+      </p:grpSpPr>
+      <p:sp>
+        <p:nvSpPr>
+          <p:cNvPr id="2" name="Title 1"/>
+          <p:cNvSpPr>
+            <a:spLocks noGrp="1"/>
+          </p:cNvSpPr>
+          <p:nvPr>
+            <p:ph type="title"/>
+          </p:nvPr>
+        </p:nvSpPr>
+        <p:spPr/>
+        <p:txBody>
+          <a:bodyPr/>
+          <a:lstStyle/>
+          <a:p>
+            <a:r>
+              <a:rPr lang="en-US" dirty="0" err="1" smtClean="0"/>
+              <a:t>DisplayModeProvider</a:t>
+            </a:r>
+            <a:endParaRPr lang="en-US" dirty="0"/>
+          </a:p>
+        </p:txBody>
+      </p:sp>
+      <p:sp>
+        <p:nvSpPr>
+          <p:cNvPr id="3" name="Text Placeholder 2"/>
+          <p:cNvSpPr>
+            <a:spLocks noGrp="1"/>
+          </p:cNvSpPr>
+          <p:nvPr>
+            <p:ph type="body" idx="1"/>
+          </p:nvPr>
+        </p:nvSpPr>
+        <p:spPr/>
+        <p:txBody>
+          <a:bodyPr/>
+          <a:lstStyle/>
+          <a:p>
+            <a:r>
+              <a:rPr lang="en-US" dirty="0" smtClean="0"/>
+              <a:t>Holds registered </a:t>
+            </a:r>
+            <a:r>
+              <a:rPr lang="en-US" dirty="0" err="1" smtClean="0"/>
+              <a:t>IDisplayMode</a:t>
+            </a:r>
+            <a:r>
+              <a:rPr lang="en-US" dirty="0" smtClean="0"/>
+              <a:t> collection</a:t>
+            </a:r>
+          </a:p>
+          <a:p>
+            <a:pPr lvl="1"/>
+            <a:r>
+              <a:rPr lang="en-US" dirty="0" smtClean="0"/>
+              <a:t>Runtime will query each display mode for opportunity to override view</a:t>
+            </a:r>
+          </a:p>
+        </p:txBody>
+      </p:sp>
+      <p:pic>
+        <p:nvPicPr>
+          <p:cNvPr id="2050" name="Picture 2"/>
+          <p:cNvPicPr>
+            <a:picLocks noChangeAspect="1" noChangeArrowheads="1"/>
+          </p:cNvPicPr>
+          <p:nvPr/>
+        </p:nvPicPr>
+        <p:blipFill>
+          <a:blip r:embed="rId2">
+            <a:extLst>
+              <a:ext uri="{28A0092B-C50C-407E-A947-70E740481C1C}">
+                <a14:useLocalDpi xmlns:a14="http://schemas.microsoft.com/office/drawing/2010/main" val="0"/>
+              </a:ext>
+            </a:extLst>
+          </a:blip>
+          <a:srcRect/>
+          <a:stretch>
+            <a:fillRect/>
+          </a:stretch>
+        </p:blipFill>
+        <p:spPr bwMode="auto">
+          <a:xfrm>
+            <a:off x="914400" y="3200400"/>
+            <a:ext cx="7272338" cy="2057400"/>
+          </a:xfrm>
+          <a:prstGeom prst="rect">
+            <a:avLst/>
+          </a:prstGeom>
+          <a:ln>
+            <a:noFill/>
+          </a:ln>
+          <a:effectLst>
+            <a:outerShdw blurRad="292100" dist="139700" dir="2700000" algn="tl" rotWithShape="0">
+              <a:srgbClr val="333333">
+                <a:alpha val="65000"/>
+              </a:srgbClr>
+            </a:outerShdw>
+          </a:effectLst>
+          <a:extLst>
+            <a:ext uri="{909E8E84-426E-40DD-AFC4-6F175D3DCCD1}">
+              <a14:hiddenFill xmlns:a14="http://schemas.microsoft.com/office/drawing/2010/main">
+                <a:solidFill>
+                  <a:schemeClr val="accent1"/>
+                </a:solidFill>
+              </a14:hiddenFill>
+            </a:ext>
+            <a:ext uri="{91240B29-F687-4F45-9708-019B960494DF}">
+              <a14:hiddenLine xmlns:a14="http://schemas.microsoft.com/office/drawing/2010/main" w="9525">
+                <a:solidFill>
+                  <a:schemeClr val="tx1"/>
+                </a:solidFill>
+                <a:miter lim="800000"/>
+                <a:headEnd/>
+                <a:tailEnd/>
+              </a14:hiddenLine>
+            </a:ext>
+          </a:extLst>
+        </p:spPr>
+      </p:pic>
+    </p:spTree>
+    <p:extLst>
+      <p:ext uri="{BB962C8B-B14F-4D97-AF65-F5344CB8AC3E}">
+        <p14:creationId xmlns:p14="http://schemas.microsoft.com/office/powerpoint/2010/main" val="1933730815"/>
+      </p:ext>
+    </p:extLst>
+  </p:cSld>
+  <p:clrMapOvr>
+    <a:masterClrMapping/>
+  </p:clrMapOvr>
+  <p:transition>
+    <p:fade/>
+  </p:transition>
+  <p:timing>
+    <p:tnLst>
+      <p:par>
+        <p:cTn id="1" dur="indefinite" restart="never" nodeType="tmRoot">
+          <p:childTnLst>
+            <p:seq concurrent="1" nextAc="seek">
+              <p:cTn id="2" dur="indefinite" nodeType="mainSeq">
+                <p:childTnLst>
+                  <p:par>
+                    <p:cTn id="3" fill="hold">
+                      <p:stCondLst>
+                        <p:cond delay="indefinite"/>
+                      </p:stCondLst>
+                      <p:childTnLst>
+                        <p:par>
+                          <p:cTn id="4" fill="hold">
+                            <p:stCondLst>
+                              <p:cond delay="0"/>
+                            </p:stCondLst>
+                            <p:childTnLst>
+                              <p:par>
+                                <p:cTn id="5" presetID="10" presetClass="entr" presetSubtype="0" fill="hold" nodeType="clickEffect">
+                                  <p:stCondLst>
+                                    <p:cond delay="0"/>
+                                  </p:stCondLst>
+                                  <p:childTnLst>
+                                    <p:set>
+                                      <p:cBhvr>
+                                        <p:cTn id="6" dur="1" fill="hold">
+                                          <p:stCondLst>
+                                            <p:cond delay="0"/>
+                                          </p:stCondLst>
+                                        </p:cTn>
+                                        <p:tgtEl>
+                                          <p:spTgt spid="2050"/>
+                                        </p:tgtEl>
+                                        <p:attrNameLst>
+                                          <p:attrName>style.visibility</p:attrName>
+                                        </p:attrNameLst>
+                                      </p:cBhvr>
+                                      <p:to>
+                                        <p:strVal val="visible"/>
+                                      </p:to>
+                                    </p:set>
+                                    <p:animEffect transition="in" filter="fade">
+                                      <p:cBhvr>
+                                        <p:cTn id="7" dur="500"/>
+                                        <p:tgtEl>
+                                          <p:spTgt spid="2050"/>
+                                        </p:tgtEl>
+                                      </p:cBhvr>
+                                    </p:animEffect>
+                                  </p:childTnLst>
+                                </p:cTn>
+                              </p:par>
+                            </p:childTnLst>
+                          </p:cTn>
+                        </p:par>
+                      </p:childTnLst>
+                    </p:cTn>
+                  </p:par>
+                </p:childTnLst>
+              </p:cTn>
+              <p:prevCondLst>
+                <p:cond evt="onPrev" delay="0">
+                  <p:tgtEl>
+                    <p:sldTgt/>
+                  </p:tgtEl>
+                </p:cond>
+              </p:prevCondLst>
+              <p:nextCondLst>
+                <p:cond evt="onNext" delay="0">
+                  <p:tgtEl>
+                    <p:sldTgt/>
+                  </p:tgtEl>
+                </p:cond>
+              </p:nextCondLst>
+            </p:seq>
+          </p:childTnLst>
+        </p:cTn>
+      </p:par>
+    </p:tnLst>
+  </p:timing>
+</p:sld>
+</file>
+
+<file path=ppt/slides/slide6.xml><?xml version="1.0" encoding="utf-8"?>
+<p:sld xmlns:a="http://schemas.openxmlformats.org/drawingml/2006/main" xmlns:r="http://schemas.openxmlformats.org/officeDocument/2006/relationships" xmlns:p="http://schemas.openxmlformats.org/presentationml/2006/main">
+  <p:cSld>
+    <p:spTree>
+      <p:nvGrpSpPr>
+        <p:cNvPr id="1" name=""/>
+        <p:cNvGrpSpPr/>
+        <p:nvPr/>
+      </p:nvGrpSpPr>
+      <p:grpSpPr>
+        <a:xfrm>
+          <a:off x="0" y="0"/>
+          <a:ext cx="0" cy="0"/>
+          <a:chOff x="0" y="0"/>
+          <a:chExt cx="0" cy="0"/>
+        </a:xfrm>
+      </p:grpSpPr>
+      <p:sp>
+        <p:nvSpPr>
+          <p:cNvPr id="2" name="Title 1"/>
+          <p:cNvSpPr>
+            <a:spLocks noGrp="1"/>
+          </p:cNvSpPr>
+          <p:nvPr>
+            <p:ph type="title"/>
+          </p:nvPr>
+        </p:nvSpPr>
+        <p:spPr/>
+        <p:txBody>
+          <a:bodyPr/>
+          <a:lstStyle/>
+          <a:p>
+            <a:r>
+              <a:rPr lang="en-US" dirty="0" smtClean="0"/>
+              <a:t>Browser Overriding</a:t>
+            </a:r>
+            <a:endParaRPr lang="en-US" dirty="0"/>
+          </a:p>
+        </p:txBody>
+      </p:sp>
+      <p:sp>
+        <p:nvSpPr>
+          <p:cNvPr id="4" name="Text Placeholder 2"/>
+          <p:cNvSpPr>
+            <a:spLocks noGrp="1"/>
+          </p:cNvSpPr>
+          <p:nvPr>
+            <p:ph type="body" idx="4294967295"/>
+          </p:nvPr>
+        </p:nvSpPr>
+        <p:spPr>
+          <a:xfrm>
+            <a:off x="457200" y="1371600"/>
+            <a:ext cx="8229600" cy="4495800"/>
+          </a:xfrm>
+          <a:prstGeom prst="rect">
+            <a:avLst/>
+          </a:prstGeom>
+        </p:spPr>
+        <p:txBody>
+          <a:bodyPr/>
+          <a:lstStyle/>
+          <a:p>
+            <a:r>
+              <a:rPr lang="en-US" dirty="0" smtClean="0"/>
+              <a:t>Override the user agent for a given user session</a:t>
+            </a:r>
+          </a:p>
+          <a:p>
+            <a:pPr lvl="1"/>
+            <a:r>
+              <a:rPr lang="en-US" dirty="0" smtClean="0"/>
+              <a:t>Useful for “View The Mobile Version” type links</a:t>
+            </a:r>
+            <a:endParaRPr lang="en-US" dirty="0"/>
+          </a:p>
+        </p:txBody>
+      </p:sp>
+      <p:pic>
+        <p:nvPicPr>
+          <p:cNvPr id="1026" name="Picture 2"/>
+          <p:cNvPicPr>
+            <a:picLocks noChangeAspect="1" noChangeArrowheads="1"/>
+          </p:cNvPicPr>
+          <p:nvPr/>
+        </p:nvPicPr>
+        <p:blipFill>
+          <a:blip r:embed="rId2">
+            <a:extLst>
+              <a:ext uri="{28A0092B-C50C-407E-A947-70E740481C1C}">
+                <a14:useLocalDpi xmlns:a14="http://schemas.microsoft.com/office/drawing/2010/main" val="0"/>
+              </a:ext>
+            </a:extLst>
+          </a:blip>
+          <a:srcRect/>
+          <a:stretch>
+            <a:fillRect/>
+          </a:stretch>
+        </p:blipFill>
+        <p:spPr bwMode="auto">
+          <a:xfrm>
+            <a:off x="1143000" y="2819400"/>
+            <a:ext cx="6935429" cy="1885950"/>
+          </a:xfrm>
+          <a:prstGeom prst="rect">
+            <a:avLst/>
+          </a:prstGeom>
+          <a:ln>
+            <a:noFill/>
+          </a:ln>
+          <a:effectLst>
+            <a:outerShdw blurRad="292100" dist="139700" dir="2700000" algn="tl" rotWithShape="0">
+              <a:srgbClr val="333333">
+                <a:alpha val="65000"/>
+              </a:srgbClr>
+            </a:outerShdw>
+          </a:effectLst>
+          <a:extLst>
+            <a:ext uri="{909E8E84-426E-40DD-AFC4-6F175D3DCCD1}">
+              <a14:hiddenFill xmlns:a14="http://schemas.microsoft.com/office/drawing/2010/main">
+                <a:solidFill>
+                  <a:schemeClr val="accent1"/>
+                </a:solidFill>
+              </a14:hiddenFill>
+            </a:ext>
+            <a:ext uri="{91240B29-F687-4F45-9708-019B960494DF}">
+              <a14:hiddenLine xmlns:a14="http://schemas.microsoft.com/office/drawing/2010/main" w="9525">
+                <a:solidFill>
+                  <a:schemeClr val="tx1"/>
+                </a:solidFill>
+                <a:miter lim="800000"/>
+                <a:headEnd/>
+                <a:tailEnd/>
+              </a14:hiddenLine>
+            </a:ext>
+          </a:extLst>
+        </p:spPr>
+      </p:pic>
+    </p:spTree>
+    <p:extLst>
+      <p:ext uri="{BB962C8B-B14F-4D97-AF65-F5344CB8AC3E}">
+        <p14:creationId xmlns:p14="http://schemas.microsoft.com/office/powerpoint/2010/main" val="3071507612"/>
+      </p:ext>
+    </p:extLst>
+  </p:cSld>
+  <p:clrMapOvr>
+    <a:masterClrMapping/>
+  </p:clrMapOvr>
+  <p:transition>
+    <p:fade/>
+  </p:transition>
+  <p:timing>
+    <p:tnLst>
+      <p:par>
+        <p:cTn id="1" dur="indefinite" restart="never" nodeType="tmRoot">
+          <p:childTnLst>
+            <p:seq concurrent="1" nextAc="seek">
+              <p:cTn id="2" dur="indefinite" nodeType="mainSeq">
+                <p:childTnLst>
+                  <p:par>
+                    <p:cTn id="3" fill="hold">
+                      <p:stCondLst>
+                        <p:cond delay="indefinite"/>
+                      </p:stCondLst>
+                      <p:childTnLst>
+                        <p:par>
+                          <p:cTn id="4" fill="hold">
+                            <p:stCondLst>
+                              <p:cond delay="0"/>
+                            </p:stCondLst>
+                            <p:childTnLst>
+                              <p:par>
+                                <p:cTn id="5" presetID="10" presetClass="entr" presetSubtype="0" fill="hold" nodeType="clickEffect">
+                                  <p:stCondLst>
+                                    <p:cond delay="0"/>
+                                  </p:stCondLst>
+                                  <p:childTnLst>
+                                    <p:set>
+                                      <p:cBhvr>
+                                        <p:cTn id="6" dur="1" fill="hold">
+                                          <p:stCondLst>
+                                            <p:cond delay="0"/>
+                                          </p:stCondLst>
+                                        </p:cTn>
+                                        <p:tgtEl>
+                                          <p:spTgt spid="1026"/>
+                                        </p:tgtEl>
+                                        <p:attrNameLst>
+                                          <p:attrName>style.visibility</p:attrName>
+                                        </p:attrNameLst>
+                                      </p:cBhvr>
+                                      <p:to>
+                                        <p:strVal val="visible"/>
+                                      </p:to>
+                                    </p:set>
+                                    <p:animEffect transition="in" filter="fade">
+                                      <p:cBhvr>
+                                        <p:cTn id="7" dur="500"/>
+                                        <p:tgtEl>
+                                          <p:spTgt spid="1026"/>
+                                        </p:tgtEl>
+                                      </p:cBhvr>
+                                    </p:animEffect>
+                                  </p:childTnLst>
+                                </p:cTn>
+                              </p:par>
+                            </p:childTnLst>
+                          </p:cTn>
+                        </p:par>
+                      </p:childTnLst>
+                    </p:cTn>
+                  </p:par>
+                </p:childTnLst>
+              </p:cTn>
+              <p:prevCondLst>
+                <p:cond evt="onPrev" delay="0">
+                  <p:tgtEl>
+                    <p:sldTgt/>
+                  </p:tgtEl>
+                </p:cond>
+              </p:prevCondLst>
+              <p:nextCondLst>
+                <p:cond evt="onNext" delay="0">
+                  <p:tgtEl>
+                    <p:sldTgt/>
+                  </p:tgtEl>
+                </p:cond>
+              </p:nextCondLst>
+            </p:seq>
+          </p:childTnLst>
+        </p:cTn>
+      </p:par>
+    </p:tnLst>
+  </p:timing>
+</p:sld>
+</file>
+
+<file path=ppt/slides/slide7.xml><?xml version="1.0" encoding="utf-8"?>
 <p:sld xmlns:a="http://schemas.openxmlformats.org/drawingml/2006/main" xmlns:r="http://schemas.openxmlformats.org/officeDocument/2006/relationships" xmlns:p="http://schemas.openxmlformats.org/presentationml/2006/main">
   <p:cSld>
     <p:spTree>
@@ -6320,142 +8322,7 @@
 </p:sld>
 </file>
 
-<file path=ppt/slides/slide4.xml><?xml version="1.0" encoding="utf-8"?>
-<p:sld xmlns:a="http://schemas.openxmlformats.org/drawingml/2006/main" xmlns:r="http://schemas.openxmlformats.org/officeDocument/2006/relationships" xmlns:p="http://schemas.openxmlformats.org/presentationml/2006/main">
-  <p:cSld>
-    <p:spTree>
-      <p:nvGrpSpPr>
-        <p:cNvPr id="1" name=""/>
-        <p:cNvGrpSpPr/>
-        <p:nvPr/>
-      </p:nvGrpSpPr>
-      <p:grpSpPr>
-        <a:xfrm>
-          <a:off x="0" y="0"/>
-          <a:ext cx="0" cy="0"/>
-          <a:chOff x="0" y="0"/>
-          <a:chExt cx="0" cy="0"/>
-        </a:xfrm>
-      </p:grpSpPr>
-      <p:sp>
-        <p:nvSpPr>
-          <p:cNvPr id="2" name="Title 1"/>
-          <p:cNvSpPr>
-            <a:spLocks noGrp="1"/>
-          </p:cNvSpPr>
-          <p:nvPr>
-            <p:ph type="title"/>
-          </p:nvPr>
-        </p:nvSpPr>
-        <p:spPr/>
-        <p:txBody>
-          <a:bodyPr/>
-          <a:lstStyle/>
-          <a:p>
-            <a:endParaRPr lang="en-US"/>
-          </a:p>
-        </p:txBody>
-      </p:sp>
-      <p:sp>
-        <p:nvSpPr>
-          <p:cNvPr id="3" name="Text Placeholder 2"/>
-          <p:cNvSpPr>
-            <a:spLocks noGrp="1"/>
-          </p:cNvSpPr>
-          <p:nvPr>
-            <p:ph type="body" idx="1"/>
-          </p:nvPr>
-        </p:nvSpPr>
-        <p:spPr/>
-        <p:txBody>
-          <a:bodyPr/>
-          <a:lstStyle/>
-          <a:p>
-            <a:endParaRPr lang="en-US"/>
-          </a:p>
-        </p:txBody>
-      </p:sp>
-      <p:pic>
-        <p:nvPicPr>
-          <p:cNvPr id="3074" name="Picture 2"/>
-          <p:cNvPicPr>
-            <a:picLocks noChangeAspect="1" noChangeArrowheads="1"/>
-          </p:cNvPicPr>
-          <p:nvPr/>
-        </p:nvPicPr>
-        <p:blipFill>
-          <a:blip r:embed="rId2">
-            <a:extLst>
-              <a:ext uri="{28A0092B-C50C-407E-A947-70E740481C1C}">
-                <a14:useLocalDpi xmlns:a14="http://schemas.microsoft.com/office/drawing/2010/main" val="0"/>
-              </a:ext>
-            </a:extLst>
-          </a:blip>
-          <a:srcRect/>
-          <a:stretch>
-            <a:fillRect/>
-          </a:stretch>
-        </p:blipFill>
-        <p:spPr bwMode="auto">
-          <a:xfrm>
-            <a:off x="228600" y="1143000"/>
-            <a:ext cx="8784572" cy="4038600"/>
-          </a:xfrm>
-          <a:prstGeom prst="rect">
-            <a:avLst/>
-          </a:prstGeom>
-          <a:noFill/>
-          <a:ln>
-            <a:noFill/>
-          </a:ln>
-          <a:effectLst/>
-          <a:extLst>
-            <a:ext uri="{909E8E84-426E-40DD-AFC4-6F175D3DCCD1}">
-              <a14:hiddenFill xmlns:a14="http://schemas.microsoft.com/office/drawing/2010/main">
-                <a:solidFill>
-                  <a:schemeClr val="accent1"/>
-                </a:solidFill>
-              </a14:hiddenFill>
-            </a:ext>
-            <a:ext uri="{91240B29-F687-4F45-9708-019B960494DF}">
-              <a14:hiddenLine xmlns:a14="http://schemas.microsoft.com/office/drawing/2010/main" w="9525">
-                <a:solidFill>
-                  <a:schemeClr val="tx1"/>
-                </a:solidFill>
-                <a:miter lim="800000"/>
-                <a:headEnd/>
-                <a:tailEnd/>
-              </a14:hiddenLine>
-            </a:ext>
-            <a:ext uri="{AF507438-7753-43E0-B8FC-AC1667EBCBE1}">
-              <a14:hiddenEffects xmlns:a14="http://schemas.microsoft.com/office/drawing/2010/main">
-                <a:effectLst>
-                  <a:outerShdw dist="35921" dir="2700000" algn="ctr" rotWithShape="0">
-                    <a:schemeClr val="bg2"/>
-                  </a:outerShdw>
-                </a:effectLst>
-              </a14:hiddenEffects>
-            </a:ext>
-          </a:extLst>
-        </p:spPr>
-      </p:pic>
-    </p:spTree>
-    <p:extLst>
-      <p:ext uri="{BB962C8B-B14F-4D97-AF65-F5344CB8AC3E}">
-        <p14:creationId xmlns:p14="http://schemas.microsoft.com/office/powerpoint/2010/main" val="2258571044"/>
-      </p:ext>
-    </p:extLst>
-  </p:cSld>
-  <p:clrMapOvr>
-    <a:masterClrMapping/>
-  </p:clrMapOvr>
-  <p:transition>
-    <p:fade/>
-  </p:transition>
-</p:sld>
-</file>
-
-<file path=ppt/slides/slide5.xml><?xml version="1.0" encoding="utf-8"?>
+<file path=ppt/slides/slide8.xml><?xml version="1.0" encoding="utf-8"?>
 <p:sld xmlns:a="http://schemas.openxmlformats.org/drawingml/2006/main" xmlns:r="http://schemas.openxmlformats.org/officeDocument/2006/relationships" xmlns:p="http://schemas.openxmlformats.org/presentationml/2006/main">
   <p:cSld>
     <p:spTree>
@@ -6597,7 +8464,7 @@
 </p:sld>
 </file>
 
-<file path=ppt/slides/slide6.xml><?xml version="1.0" encoding="utf-8"?>
+<file path=ppt/slides/slide9.xml><?xml version="1.0" encoding="utf-8"?>
 <p:sld xmlns:a="http://schemas.openxmlformats.org/drawingml/2006/main" xmlns:r="http://schemas.openxmlformats.org/officeDocument/2006/relationships" xmlns:p="http://schemas.openxmlformats.org/presentationml/2006/main">
   <p:cSld>
     <p:spTree>
@@ -6736,573 +8603,6 @@
     <p:extLst>
       <p:ext uri="{BB962C8B-B14F-4D97-AF65-F5344CB8AC3E}">
         <p14:creationId xmlns:p14="http://schemas.microsoft.com/office/powerpoint/2010/main" val="2796366555"/>
-      </p:ext>
-    </p:extLst>
-  </p:cSld>
-  <p:clrMapOvr>
-    <a:masterClrMapping/>
-  </p:clrMapOvr>
-  <p:transition>
-    <p:fade/>
-  </p:transition>
-  <p:timing>
-    <p:tnLst>
-      <p:par>
-        <p:cTn id="1" dur="indefinite" restart="never" nodeType="tmRoot"/>
-      </p:par>
-    </p:tnLst>
-  </p:timing>
-</p:sld>
-</file>
-
-<file path=ppt/slides/slide7.xml><?xml version="1.0" encoding="utf-8"?>
-<p:sld xmlns:a="http://schemas.openxmlformats.org/drawingml/2006/main" xmlns:r="http://schemas.openxmlformats.org/officeDocument/2006/relationships" xmlns:p="http://schemas.openxmlformats.org/presentationml/2006/main">
-  <p:cSld>
-    <p:spTree>
-      <p:nvGrpSpPr>
-        <p:cNvPr id="1" name=""/>
-        <p:cNvGrpSpPr/>
-        <p:nvPr/>
-      </p:nvGrpSpPr>
-      <p:grpSpPr>
-        <a:xfrm>
-          <a:off x="0" y="0"/>
-          <a:ext cx="0" cy="0"/>
-          <a:chOff x="0" y="0"/>
-          <a:chExt cx="0" cy="0"/>
-        </a:xfrm>
-      </p:grpSpPr>
-      <p:sp>
-        <p:nvSpPr>
-          <p:cNvPr id="2" name="Title 1"/>
-          <p:cNvSpPr>
-            <a:spLocks noGrp="1"/>
-          </p:cNvSpPr>
-          <p:nvPr>
-            <p:ph type="title"/>
-          </p:nvPr>
-        </p:nvSpPr>
-        <p:spPr/>
-        <p:txBody>
-          <a:bodyPr/>
-          <a:lstStyle/>
-          <a:p>
-            <a:r>
-              <a:rPr lang="en-US" dirty="0" smtClean="0"/>
-              <a:t>Navigation</a:t>
-            </a:r>
-            <a:endParaRPr lang="en-US" dirty="0"/>
-          </a:p>
-        </p:txBody>
-      </p:sp>
-      <p:sp>
-        <p:nvSpPr>
-          <p:cNvPr id="3" name="Text Placeholder 2"/>
-          <p:cNvSpPr>
-            <a:spLocks noGrp="1"/>
-          </p:cNvSpPr>
-          <p:nvPr>
-            <p:ph type="body" idx="1"/>
-          </p:nvPr>
-        </p:nvSpPr>
-        <p:spPr/>
-        <p:txBody>
-          <a:bodyPr/>
-          <a:lstStyle/>
-          <a:p>
-            <a:r>
-              <a:rPr lang="en-US" dirty="0" smtClean="0"/>
-              <a:t>Default link and submit behavior is </a:t>
-            </a:r>
-            <a:r>
-              <a:rPr lang="en-US" dirty="0" err="1" smtClean="0"/>
-              <a:t>asynch</a:t>
-            </a:r>
-            <a:endParaRPr lang="en-US" dirty="0" smtClean="0"/>
-          </a:p>
-          <a:p>
-            <a:pPr lvl="1"/>
-            <a:r>
-              <a:rPr lang="en-US" dirty="0" smtClean="0"/>
-              <a:t>Impacts script and DOM structures</a:t>
-            </a:r>
-          </a:p>
-          <a:p>
-            <a:endParaRPr lang="en-US" dirty="0"/>
-          </a:p>
-        </p:txBody>
-      </p:sp>
-      <p:pic>
-        <p:nvPicPr>
-          <p:cNvPr id="3074" name="Picture 2"/>
-          <p:cNvPicPr>
-            <a:picLocks noChangeAspect="1" noChangeArrowheads="1"/>
-          </p:cNvPicPr>
-          <p:nvPr/>
-        </p:nvPicPr>
-        <p:blipFill>
-          <a:blip r:embed="rId2">
-            <a:extLst>
-              <a:ext uri="{28A0092B-C50C-407E-A947-70E740481C1C}">
-                <a14:useLocalDpi xmlns:a14="http://schemas.microsoft.com/office/drawing/2010/main" val="0"/>
-              </a:ext>
-            </a:extLst>
-          </a:blip>
-          <a:srcRect/>
-          <a:stretch>
-            <a:fillRect/>
-          </a:stretch>
-        </p:blipFill>
-        <p:spPr bwMode="auto">
-          <a:xfrm>
-            <a:off x="457200" y="3657600"/>
-            <a:ext cx="8369559" cy="1452829"/>
-          </a:xfrm>
-          <a:prstGeom prst="rect">
-            <a:avLst/>
-          </a:prstGeom>
-          <a:noFill/>
-          <a:ln>
-            <a:noFill/>
-          </a:ln>
-          <a:effectLst/>
-          <a:extLst>
-            <a:ext uri="{909E8E84-426E-40DD-AFC4-6F175D3DCCD1}">
-              <a14:hiddenFill xmlns:a14="http://schemas.microsoft.com/office/drawing/2010/main">
-                <a:solidFill>
-                  <a:schemeClr val="accent1"/>
-                </a:solidFill>
-              </a14:hiddenFill>
-            </a:ext>
-            <a:ext uri="{91240B29-F687-4F45-9708-019B960494DF}">
-              <a14:hiddenLine xmlns:a14="http://schemas.microsoft.com/office/drawing/2010/main" w="9525">
-                <a:solidFill>
-                  <a:schemeClr val="tx1"/>
-                </a:solidFill>
-                <a:miter lim="800000"/>
-                <a:headEnd/>
-                <a:tailEnd/>
-              </a14:hiddenLine>
-            </a:ext>
-            <a:ext uri="{AF507438-7753-43E0-B8FC-AC1667EBCBE1}">
-              <a14:hiddenEffects xmlns:a14="http://schemas.microsoft.com/office/drawing/2010/main">
-                <a:effectLst>
-                  <a:outerShdw dist="35921" dir="2700000" algn="ctr" rotWithShape="0">
-                    <a:schemeClr val="bg2"/>
-                  </a:outerShdw>
-                </a:effectLst>
-              </a14:hiddenEffects>
-            </a:ext>
-          </a:extLst>
-        </p:spPr>
-      </p:pic>
-      <p:cxnSp>
-        <p:nvCxnSpPr>
-          <p:cNvPr id="5" name="Straight Arrow Connector 4"/>
-          <p:cNvCxnSpPr/>
-          <p:nvPr/>
-        </p:nvCxnSpPr>
-        <p:spPr bwMode="auto">
-          <a:xfrm>
-            <a:off x="1524000" y="3048000"/>
-            <a:ext cx="685800" cy="609600"/>
-          </a:xfrm>
-          <a:prstGeom prst="straightConnector1">
-            <a:avLst/>
-          </a:prstGeom>
-          <a:gradFill rotWithShape="1">
-            <a:gsLst>
-              <a:gs pos="0">
-                <a:srgbClr val="A4D289"/>
-              </a:gs>
-              <a:gs pos="100000">
-                <a:schemeClr val="bg1"/>
-              </a:gs>
-            </a:gsLst>
-            <a:lin ang="5400000" scaled="1"/>
-          </a:gradFill>
-          <a:ln w="63500" cap="flat" cmpd="sng" algn="ctr">
-            <a:solidFill>
-              <a:srgbClr val="C00000"/>
-            </a:solidFill>
-            <a:prstDash val="solid"/>
-            <a:round/>
-            <a:headEnd type="none" w="med" len="med"/>
-            <a:tailEnd type="arrow"/>
-          </a:ln>
-          <a:effectLst/>
-        </p:spPr>
-      </p:cxnSp>
-      <p:cxnSp>
-        <p:nvCxnSpPr>
-          <p:cNvPr id="7" name="Straight Arrow Connector 6"/>
-          <p:cNvCxnSpPr/>
-          <p:nvPr/>
-        </p:nvCxnSpPr>
-        <p:spPr bwMode="auto">
-          <a:xfrm flipV="1">
-            <a:off x="990600" y="4724400"/>
-            <a:ext cx="1219200" cy="1447800"/>
-          </a:xfrm>
-          <a:prstGeom prst="straightConnector1">
-            <a:avLst/>
-          </a:prstGeom>
-          <a:gradFill rotWithShape="1">
-            <a:gsLst>
-              <a:gs pos="0">
-                <a:srgbClr val="A4D289"/>
-              </a:gs>
-              <a:gs pos="100000">
-                <a:schemeClr val="bg1"/>
-              </a:gs>
-            </a:gsLst>
-            <a:lin ang="5400000" scaled="1"/>
-          </a:gradFill>
-          <a:ln w="63500" cap="flat" cmpd="sng" algn="ctr">
-            <a:solidFill>
-              <a:srgbClr val="C00000"/>
-            </a:solidFill>
-            <a:prstDash val="solid"/>
-            <a:round/>
-            <a:headEnd type="none" w="med" len="med"/>
-            <a:tailEnd type="arrow"/>
-          </a:ln>
-          <a:effectLst/>
-        </p:spPr>
-      </p:cxnSp>
-    </p:spTree>
-    <p:extLst>
-      <p:ext uri="{BB962C8B-B14F-4D97-AF65-F5344CB8AC3E}">
-        <p14:creationId xmlns:p14="http://schemas.microsoft.com/office/powerpoint/2010/main" val="2669991755"/>
-      </p:ext>
-    </p:extLst>
-  </p:cSld>
-  <p:clrMapOvr>
-    <a:masterClrMapping/>
-  </p:clrMapOvr>
-  <p:transition>
-    <p:fade/>
-  </p:transition>
-  <p:timing>
-    <p:tnLst>
-      <p:par>
-        <p:cTn id="1" dur="indefinite" restart="never" nodeType="tmRoot"/>
-      </p:par>
-    </p:tnLst>
-  </p:timing>
-</p:sld>
-</file>
-
-<file path=ppt/slides/slide8.xml><?xml version="1.0" encoding="utf-8"?>
-<p:sld xmlns:a="http://schemas.openxmlformats.org/drawingml/2006/main" xmlns:r="http://schemas.openxmlformats.org/officeDocument/2006/relationships" xmlns:p="http://schemas.openxmlformats.org/presentationml/2006/main">
-  <p:cSld>
-    <p:spTree>
-      <p:nvGrpSpPr>
-        <p:cNvPr id="1" name=""/>
-        <p:cNvGrpSpPr/>
-        <p:nvPr/>
-      </p:nvGrpSpPr>
-      <p:grpSpPr>
-        <a:xfrm>
-          <a:off x="0" y="0"/>
-          <a:ext cx="0" cy="0"/>
-          <a:chOff x="0" y="0"/>
-          <a:chExt cx="0" cy="0"/>
-        </a:xfrm>
-      </p:grpSpPr>
-      <p:sp>
-        <p:nvSpPr>
-          <p:cNvPr id="2" name="Title 1"/>
-          <p:cNvSpPr>
-            <a:spLocks noGrp="1"/>
-          </p:cNvSpPr>
-          <p:nvPr>
-            <p:ph type="title"/>
-          </p:nvPr>
-        </p:nvSpPr>
-        <p:spPr/>
-        <p:txBody>
-          <a:bodyPr/>
-          <a:lstStyle/>
-          <a:p>
-            <a:r>
-              <a:rPr lang="en-US" dirty="0" smtClean="0"/>
-              <a:t>Stopping </a:t>
-            </a:r>
-            <a:r>
-              <a:rPr lang="en-US" dirty="0" err="1" smtClean="0"/>
-              <a:t>asynch</a:t>
-            </a:r>
-            <a:r>
-              <a:rPr lang="en-US" dirty="0" smtClean="0"/>
-              <a:t> links</a:t>
-            </a:r>
-            <a:endParaRPr lang="en-US" dirty="0"/>
-          </a:p>
-        </p:txBody>
-      </p:sp>
-      <p:sp>
-        <p:nvSpPr>
-          <p:cNvPr id="3" name="Text Placeholder 2"/>
-          <p:cNvSpPr>
-            <a:spLocks noGrp="1"/>
-          </p:cNvSpPr>
-          <p:nvPr>
-            <p:ph type="body" idx="1"/>
-          </p:nvPr>
-        </p:nvSpPr>
-        <p:spPr/>
-        <p:txBody>
-          <a:bodyPr/>
-          <a:lstStyle/>
-          <a:p>
-            <a:r>
-              <a:rPr lang="en-US" dirty="0" smtClean="0"/>
-              <a:t>Uses data-</a:t>
-            </a:r>
-            <a:r>
-              <a:rPr lang="en-US" dirty="0" err="1" smtClean="0"/>
-              <a:t>ajax</a:t>
-            </a:r>
-            <a:r>
-              <a:rPr lang="en-US" dirty="0" smtClean="0"/>
-              <a:t>=false</a:t>
-            </a:r>
-          </a:p>
-          <a:p>
-            <a:r>
-              <a:rPr lang="en-US" dirty="0" smtClean="0"/>
-              <a:t>Or turn off globally</a:t>
-            </a:r>
-            <a:endParaRPr lang="en-US" dirty="0"/>
-          </a:p>
-        </p:txBody>
-      </p:sp>
-      <p:pic>
-        <p:nvPicPr>
-          <p:cNvPr id="4098" name="Picture 2"/>
-          <p:cNvPicPr>
-            <a:picLocks noChangeAspect="1" noChangeArrowheads="1"/>
-          </p:cNvPicPr>
-          <p:nvPr/>
-        </p:nvPicPr>
-        <p:blipFill>
-          <a:blip r:embed="rId2">
-            <a:extLst>
-              <a:ext uri="{28A0092B-C50C-407E-A947-70E740481C1C}">
-                <a14:useLocalDpi xmlns:a14="http://schemas.microsoft.com/office/drawing/2010/main" val="0"/>
-              </a:ext>
-            </a:extLst>
-          </a:blip>
-          <a:srcRect/>
-          <a:stretch>
-            <a:fillRect/>
-          </a:stretch>
-        </p:blipFill>
-        <p:spPr bwMode="auto">
-          <a:xfrm>
-            <a:off x="485637" y="2642994"/>
-            <a:ext cx="8201163" cy="1929006"/>
-          </a:xfrm>
-          <a:prstGeom prst="rect">
-            <a:avLst/>
-          </a:prstGeom>
-          <a:noFill/>
-          <a:ln>
-            <a:noFill/>
-          </a:ln>
-          <a:effectLst/>
-          <a:extLst>
-            <a:ext uri="{909E8E84-426E-40DD-AFC4-6F175D3DCCD1}">
-              <a14:hiddenFill xmlns:a14="http://schemas.microsoft.com/office/drawing/2010/main">
-                <a:solidFill>
-                  <a:schemeClr val="accent1"/>
-                </a:solidFill>
-              </a14:hiddenFill>
-            </a:ext>
-            <a:ext uri="{91240B29-F687-4F45-9708-019B960494DF}">
-              <a14:hiddenLine xmlns:a14="http://schemas.microsoft.com/office/drawing/2010/main" w="9525">
-                <a:solidFill>
-                  <a:schemeClr val="tx1"/>
-                </a:solidFill>
-                <a:miter lim="800000"/>
-                <a:headEnd/>
-                <a:tailEnd/>
-              </a14:hiddenLine>
-            </a:ext>
-            <a:ext uri="{AF507438-7753-43E0-B8FC-AC1667EBCBE1}">
-              <a14:hiddenEffects xmlns:a14="http://schemas.microsoft.com/office/drawing/2010/main">
-                <a:effectLst>
-                  <a:outerShdw dist="35921" dir="2700000" algn="ctr" rotWithShape="0">
-                    <a:schemeClr val="bg2"/>
-                  </a:outerShdw>
-                </a:effectLst>
-              </a14:hiddenEffects>
-            </a:ext>
-          </a:extLst>
-        </p:spPr>
-      </p:pic>
-    </p:spTree>
-    <p:extLst>
-      <p:ext uri="{BB962C8B-B14F-4D97-AF65-F5344CB8AC3E}">
-        <p14:creationId xmlns:p14="http://schemas.microsoft.com/office/powerpoint/2010/main" val="3230423066"/>
-      </p:ext>
-    </p:extLst>
-  </p:cSld>
-  <p:clrMapOvr>
-    <a:masterClrMapping/>
-  </p:clrMapOvr>
-  <p:transition>
-    <p:fade/>
-  </p:transition>
-</p:sld>
-</file>
-
-<file path=ppt/slides/slide9.xml><?xml version="1.0" encoding="utf-8"?>
-<p:sld xmlns:a="http://schemas.openxmlformats.org/drawingml/2006/main" xmlns:r="http://schemas.openxmlformats.org/officeDocument/2006/relationships" xmlns:p="http://schemas.openxmlformats.org/presentationml/2006/main">
-  <p:cSld>
-    <p:spTree>
-      <p:nvGrpSpPr>
-        <p:cNvPr id="1" name=""/>
-        <p:cNvGrpSpPr/>
-        <p:nvPr/>
-      </p:nvGrpSpPr>
-      <p:grpSpPr>
-        <a:xfrm>
-          <a:off x="0" y="0"/>
-          <a:ext cx="0" cy="0"/>
-          <a:chOff x="0" y="0"/>
-          <a:chExt cx="0" cy="0"/>
-        </a:xfrm>
-      </p:grpSpPr>
-      <p:sp>
-        <p:nvSpPr>
-          <p:cNvPr id="2" name="Title 1"/>
-          <p:cNvSpPr>
-            <a:spLocks noGrp="1"/>
-          </p:cNvSpPr>
-          <p:nvPr>
-            <p:ph type="title"/>
-          </p:nvPr>
-        </p:nvSpPr>
-        <p:spPr/>
-        <p:txBody>
-          <a:bodyPr/>
-          <a:lstStyle/>
-          <a:p>
-            <a:r>
-              <a:rPr lang="en-US" dirty="0" smtClean="0"/>
-              <a:t>Toolbars</a:t>
-            </a:r>
-            <a:endParaRPr lang="en-US" dirty="0"/>
-          </a:p>
-        </p:txBody>
-      </p:sp>
-      <p:sp>
-        <p:nvSpPr>
-          <p:cNvPr id="3" name="Text Placeholder 2"/>
-          <p:cNvSpPr>
-            <a:spLocks noGrp="1"/>
-          </p:cNvSpPr>
-          <p:nvPr>
-            <p:ph type="body" idx="1"/>
-          </p:nvPr>
-        </p:nvSpPr>
-        <p:spPr/>
-        <p:txBody>
-          <a:bodyPr/>
-          <a:lstStyle/>
-          <a:p>
-            <a:r>
-              <a:rPr lang="en-US" dirty="0" smtClean="0"/>
-              <a:t>Headers and footers</a:t>
-            </a:r>
-          </a:p>
-          <a:p>
-            <a:pPr lvl="1"/>
-            <a:r>
-              <a:rPr lang="en-US" dirty="0" smtClean="0"/>
-              <a:t>Will turn links into buttons</a:t>
-            </a:r>
-          </a:p>
-          <a:p>
-            <a:pPr lvl="1"/>
-            <a:r>
-              <a:rPr lang="en-US" dirty="0" smtClean="0"/>
-              <a:t>Can position as fixed or inline</a:t>
-            </a:r>
-            <a:endParaRPr lang="en-US" dirty="0"/>
-          </a:p>
-        </p:txBody>
-      </p:sp>
-      <p:pic>
-        <p:nvPicPr>
-          <p:cNvPr id="5122" name="Picture 2"/>
-          <p:cNvPicPr>
-            <a:picLocks noChangeAspect="1" noChangeArrowheads="1"/>
-          </p:cNvPicPr>
-          <p:nvPr/>
-        </p:nvPicPr>
-        <p:blipFill>
-          <a:blip r:embed="rId2">
-            <a:extLst>
-              <a:ext uri="{28A0092B-C50C-407E-A947-70E740481C1C}">
-                <a14:useLocalDpi xmlns:a14="http://schemas.microsoft.com/office/drawing/2010/main" val="0"/>
-              </a:ext>
-            </a:extLst>
-          </a:blip>
-          <a:srcRect/>
-          <a:stretch>
-            <a:fillRect/>
-          </a:stretch>
-        </p:blipFill>
-        <p:spPr bwMode="auto">
-          <a:xfrm>
-            <a:off x="23813" y="3381375"/>
-            <a:ext cx="9096375" cy="1647825"/>
-          </a:xfrm>
-          <a:prstGeom prst="rect">
-            <a:avLst/>
-          </a:prstGeom>
-          <a:noFill/>
-          <a:ln>
-            <a:noFill/>
-          </a:ln>
-          <a:effectLst/>
-          <a:extLst>
-            <a:ext uri="{909E8E84-426E-40DD-AFC4-6F175D3DCCD1}">
-              <a14:hiddenFill xmlns:a14="http://schemas.microsoft.com/office/drawing/2010/main">
-                <a:solidFill>
-                  <a:schemeClr val="accent1"/>
-                </a:solidFill>
-              </a14:hiddenFill>
-            </a:ext>
-            <a:ext uri="{91240B29-F687-4F45-9708-019B960494DF}">
-              <a14:hiddenLine xmlns:a14="http://schemas.microsoft.com/office/drawing/2010/main" w="9525">
-                <a:solidFill>
-                  <a:schemeClr val="tx1"/>
-                </a:solidFill>
-                <a:miter lim="800000"/>
-                <a:headEnd/>
-                <a:tailEnd/>
-              </a14:hiddenLine>
-            </a:ext>
-            <a:ext uri="{AF507438-7753-43E0-B8FC-AC1667EBCBE1}">
-              <a14:hiddenEffects xmlns:a14="http://schemas.microsoft.com/office/drawing/2010/main">
-                <a:effectLst>
-                  <a:outerShdw dist="35921" dir="2700000" algn="ctr" rotWithShape="0">
-                    <a:schemeClr val="bg2"/>
-                  </a:outerShdw>
-                </a:effectLst>
-              </a14:hiddenEffects>
-            </a:ext>
-          </a:extLst>
-        </p:spPr>
-      </p:pic>
-    </p:spTree>
-    <p:extLst>
-      <p:ext uri="{BB962C8B-B14F-4D97-AF65-F5344CB8AC3E}">
-        <p14:creationId xmlns:p14="http://schemas.microsoft.com/office/powerpoint/2010/main" val="2018169388"/>
       </p:ext>
     </p:extLst>
   </p:cSld>

</xml_diff>